<commit_message>
updates to M01.2, l1.md
</commit_message>
<xml_diff>
--- a/Slides/Module 01.2 Requirements Gathering.pptx
+++ b/Slides/Module 01.2 Requirements Gathering.pptx
@@ -5,7 +5,7 @@
     <p:sldMasterId id="2147483648" r:id="rId1"/>
   </p:sldMasterIdLst>
   <p:notesMasterIdLst>
-    <p:notesMasterId r:id="rId33"/>
+    <p:notesMasterId r:id="rId34"/>
   </p:notesMasterIdLst>
   <p:sldIdLst>
     <p:sldId id="485" r:id="rId2"/>
@@ -23,36 +23,37 @@
     <p:sldId id="538" r:id="rId14"/>
     <p:sldId id="529" r:id="rId15"/>
     <p:sldId id="539" r:id="rId16"/>
-    <p:sldId id="540" r:id="rId17"/>
-    <p:sldId id="541" r:id="rId18"/>
-    <p:sldId id="542" r:id="rId19"/>
-    <p:sldId id="543" r:id="rId20"/>
-    <p:sldId id="544" r:id="rId21"/>
-    <p:sldId id="545" r:id="rId22"/>
-    <p:sldId id="546" r:id="rId23"/>
-    <p:sldId id="528" r:id="rId24"/>
-    <p:sldId id="547" r:id="rId25"/>
-    <p:sldId id="527" r:id="rId26"/>
-    <p:sldId id="549" r:id="rId27"/>
-    <p:sldId id="550" r:id="rId28"/>
-    <p:sldId id="494" r:id="rId29"/>
-    <p:sldId id="496" r:id="rId30"/>
-    <p:sldId id="495" r:id="rId31"/>
-    <p:sldId id="498" r:id="rId32"/>
+    <p:sldId id="551" r:id="rId17"/>
+    <p:sldId id="540" r:id="rId18"/>
+    <p:sldId id="541" r:id="rId19"/>
+    <p:sldId id="542" r:id="rId20"/>
+    <p:sldId id="543" r:id="rId21"/>
+    <p:sldId id="544" r:id="rId22"/>
+    <p:sldId id="545" r:id="rId23"/>
+    <p:sldId id="546" r:id="rId24"/>
+    <p:sldId id="528" r:id="rId25"/>
+    <p:sldId id="547" r:id="rId26"/>
+    <p:sldId id="527" r:id="rId27"/>
+    <p:sldId id="549" r:id="rId28"/>
+    <p:sldId id="550" r:id="rId29"/>
+    <p:sldId id="494" r:id="rId30"/>
+    <p:sldId id="496" r:id="rId31"/>
+    <p:sldId id="495" r:id="rId32"/>
+    <p:sldId id="498" r:id="rId33"/>
   </p:sldIdLst>
   <p:sldSz cx="12192000" cy="6858000"/>
   <p:notesSz cx="9144000" cy="6858000"/>
   <p:embeddedFontLst>
     <p:embeddedFont>
       <p:font typeface="Ink Free" panose="03080402000500000000" pitchFamily="66" charset="0"/>
-      <p:regular r:id="rId34"/>
+      <p:regular r:id="rId35"/>
     </p:embeddedFont>
     <p:embeddedFont>
       <p:font typeface="Verdana" panose="020B0604030504040204" pitchFamily="34" charset="0"/>
-      <p:regular r:id="rId35"/>
-      <p:bold r:id="rId36"/>
-      <p:italic r:id="rId37"/>
-      <p:boldItalic r:id="rId38"/>
+      <p:regular r:id="rId36"/>
+      <p:bold r:id="rId37"/>
+      <p:italic r:id="rId38"/>
+      <p:boldItalic r:id="rId39"/>
     </p:embeddedFont>
   </p:embeddedFontLst>
   <p:defaultTextStyle>
@@ -170,6 +171,7 @@
             <p14:sldId id="538"/>
             <p14:sldId id="529"/>
             <p14:sldId id="539"/>
+            <p14:sldId id="551"/>
             <p14:sldId id="540"/>
             <p14:sldId id="541"/>
             <p14:sldId id="542"/>
@@ -6113,7 +6115,7 @@
           <a:p>
             <a:fld id="{7C7E5181-6CF5-45F7-A87A-E0E0B1FD7549}" type="datetimeFigureOut">
               <a:rPr lang="en-US" smtClean="0"/>
-              <a:t>12/2/2024</a:t>
+              <a:t>12/26/2024</a:t>
             </a:fld>
             <a:endParaRPr lang="en-US"/>
           </a:p>
@@ -6833,7 +6835,10 @@
           <a:bodyPr/>
           <a:lstStyle/>
           <a:p>
-            <a:endParaRPr lang="en-US" dirty="0"/>
+            <a:r>
+              <a:rPr lang="en-US" dirty="0"/>
+              <a:t>Here are a few more details about what that means in the context of your project.</a:t>
+            </a:r>
           </a:p>
         </p:txBody>
       </p:sp>
@@ -6863,7 +6868,7 @@
     </p:spTree>
     <p:extLst>
       <p:ext uri="{BB962C8B-B14F-4D97-AF65-F5344CB8AC3E}">
-        <p14:creationId xmlns:p14="http://schemas.microsoft.com/office/powerpoint/2010/main" val="916900605"/>
+        <p14:creationId xmlns:p14="http://schemas.microsoft.com/office/powerpoint/2010/main" val="3467257426"/>
       </p:ext>
     </p:extLst>
   </p:cSld>
@@ -6947,7 +6952,7 @@
     </p:spTree>
     <p:extLst>
       <p:ext uri="{BB962C8B-B14F-4D97-AF65-F5344CB8AC3E}">
-        <p14:creationId xmlns:p14="http://schemas.microsoft.com/office/powerpoint/2010/main" val="1254446554"/>
+        <p14:creationId xmlns:p14="http://schemas.microsoft.com/office/powerpoint/2010/main" val="916900605"/>
       </p:ext>
     </p:extLst>
   </p:cSld>
@@ -7001,10 +7006,7 @@
           <a:bodyPr/>
           <a:lstStyle/>
           <a:p>
-            <a:r>
-              <a:rPr lang="en-US" dirty="0"/>
-              <a:t>Maybe this is desirable, maybe it's essential.</a:t>
-            </a:r>
+            <a:endParaRPr lang="en-US" dirty="0"/>
           </a:p>
         </p:txBody>
       </p:sp>
@@ -7025,7 +7027,7 @@
           <a:p>
             <a:fld id="{07937F07-1250-4CCE-B198-1B2887014F41}" type="slidenum">
               <a:rPr lang="en-US" smtClean="0"/>
-              <a:t>21</a:t>
+              <a:t>18</a:t>
             </a:fld>
             <a:endParaRPr lang="en-US"/>
           </a:p>
@@ -7034,7 +7036,7 @@
     </p:spTree>
     <p:extLst>
       <p:ext uri="{BB962C8B-B14F-4D97-AF65-F5344CB8AC3E}">
-        <p14:creationId xmlns:p14="http://schemas.microsoft.com/office/powerpoint/2010/main" val="1160450813"/>
+        <p14:creationId xmlns:p14="http://schemas.microsoft.com/office/powerpoint/2010/main" val="1254446554"/>
       </p:ext>
     </p:extLst>
   </p:cSld>
@@ -7088,7 +7090,10 @@
           <a:bodyPr/>
           <a:lstStyle/>
           <a:p>
-            <a:endParaRPr lang="en-US" dirty="0"/>
+            <a:r>
+              <a:rPr lang="en-US" dirty="0"/>
+              <a:t>Maybe this is desirable, maybe it's essential.</a:t>
+            </a:r>
           </a:p>
         </p:txBody>
       </p:sp>
@@ -7109,7 +7114,7 @@
           <a:p>
             <a:fld id="{07937F07-1250-4CCE-B198-1B2887014F41}" type="slidenum">
               <a:rPr lang="en-US" smtClean="0"/>
-              <a:t>23</a:t>
+              <a:t>22</a:t>
             </a:fld>
             <a:endParaRPr lang="en-US"/>
           </a:p>
@@ -7118,7 +7123,7 @@
     </p:spTree>
     <p:extLst>
       <p:ext uri="{BB962C8B-B14F-4D97-AF65-F5344CB8AC3E}">
-        <p14:creationId xmlns:p14="http://schemas.microsoft.com/office/powerpoint/2010/main" val="3305253114"/>
+        <p14:creationId xmlns:p14="http://schemas.microsoft.com/office/powerpoint/2010/main" val="1160450813"/>
       </p:ext>
     </p:extLst>
   </p:cSld>
@@ -7172,225 +7177,7 @@
           <a:bodyPr/>
           <a:lstStyle/>
           <a:p>
-            <a:pPr marL="0" marR="0" lvl="0" indent="0" algn="l" defTabSz="914400" rtl="0" eaLnBrk="1" fontAlgn="auto" latinLnBrk="0" hangingPunct="1">
-              <a:lnSpc>
-                <a:spcPct val="100000"/>
-              </a:lnSpc>
-              <a:spcBef>
-                <a:spcPts val="0"/>
-              </a:spcBef>
-              <a:spcAft>
-                <a:spcPts val="0"/>
-              </a:spcAft>
-              <a:buClrTx/>
-              <a:buSzTx/>
-              <a:buFontTx/>
-              <a:buNone/>
-              <a:tabLst/>
-              <a:defRPr/>
-            </a:pPr>
-            <a:r>
-              <a:rPr lang="en-US" sz="3600" dirty="0"/>
-              <a:t>What we've talked about so far are called "functional requirements"-- the minimum functions that a system must be able to perform.</a:t>
-            </a:r>
-          </a:p>
-          <a:p>
-            <a:pPr marL="0" marR="0" lvl="0" indent="0" algn="l" defTabSz="914400" rtl="0" eaLnBrk="1" fontAlgn="auto" latinLnBrk="0" hangingPunct="1">
-              <a:lnSpc>
-                <a:spcPct val="100000"/>
-              </a:lnSpc>
-              <a:spcBef>
-                <a:spcPts val="0"/>
-              </a:spcBef>
-              <a:spcAft>
-                <a:spcPts val="0"/>
-              </a:spcAft>
-              <a:buClrTx/>
-              <a:buSzTx/>
-              <a:buFontTx/>
-              <a:buNone/>
-              <a:tabLst/>
-              <a:defRPr/>
-            </a:pPr>
-            <a:endParaRPr lang="en-US" sz="3600" dirty="0"/>
-          </a:p>
-          <a:p>
-            <a:pPr marL="0" marR="0" lvl="0" indent="0" algn="l" defTabSz="914400" rtl="0" eaLnBrk="1" fontAlgn="auto" latinLnBrk="0" hangingPunct="1">
-              <a:lnSpc>
-                <a:spcPct val="100000"/>
-              </a:lnSpc>
-              <a:spcBef>
-                <a:spcPts val="0"/>
-              </a:spcBef>
-              <a:spcAft>
-                <a:spcPts val="0"/>
-              </a:spcAft>
-              <a:buClrTx/>
-              <a:buSzTx/>
-              <a:buFontTx/>
-              <a:buNone/>
-              <a:tabLst/>
-              <a:defRPr/>
-            </a:pPr>
-            <a:r>
-              <a:rPr lang="en-US" sz="3600" dirty="0"/>
-              <a:t>But there are other kinds of requirements.  These are called "non-functional" requirements.</a:t>
-            </a:r>
-          </a:p>
-          <a:p>
-            <a:pPr marL="0" marR="0" lvl="0" indent="0" algn="l" defTabSz="914400" rtl="0" eaLnBrk="1" fontAlgn="auto" latinLnBrk="0" hangingPunct="1">
-              <a:lnSpc>
-                <a:spcPct val="100000"/>
-              </a:lnSpc>
-              <a:spcBef>
-                <a:spcPts val="0"/>
-              </a:spcBef>
-              <a:spcAft>
-                <a:spcPts val="0"/>
-              </a:spcAft>
-              <a:buClrTx/>
-              <a:buSzTx/>
-              <a:buFontTx/>
-              <a:buNone/>
-              <a:tabLst/>
-              <a:defRPr/>
-            </a:pPr>
-            <a:endParaRPr lang="en-US" sz="3600" dirty="0"/>
-          </a:p>
-          <a:p>
-            <a:pPr marL="0" marR="0" lvl="0" indent="0" algn="l" defTabSz="914400" rtl="0" eaLnBrk="1" fontAlgn="auto" latinLnBrk="0" hangingPunct="1">
-              <a:lnSpc>
-                <a:spcPct val="100000"/>
-              </a:lnSpc>
-              <a:spcBef>
-                <a:spcPts val="0"/>
-              </a:spcBef>
-              <a:spcAft>
-                <a:spcPts val="0"/>
-              </a:spcAft>
-              <a:buClrTx/>
-              <a:buSzTx/>
-              <a:buFontTx/>
-              <a:buNone/>
-              <a:tabLst/>
-              <a:defRPr/>
-            </a:pPr>
-            <a:r>
-              <a:rPr lang="en-US" sz="3600" dirty="0"/>
-              <a:t>Non-functional requirements capture the </a:t>
-            </a:r>
-            <a:r>
-              <a:rPr lang="en-US" sz="3600" i="1" dirty="0"/>
-              <a:t>quality goals</a:t>
-            </a:r>
-            <a:r>
-              <a:rPr lang="en-US" sz="3600" i="0" dirty="0"/>
-              <a:t> of a system. </a:t>
-            </a:r>
-            <a:endParaRPr lang="en-US" sz="3600" dirty="0"/>
-          </a:p>
-          <a:p>
-            <a:pPr marL="0" marR="0" lvl="0" indent="0" algn="l" defTabSz="914400" rtl="0" eaLnBrk="1" fontAlgn="auto" latinLnBrk="0" hangingPunct="1">
-              <a:lnSpc>
-                <a:spcPct val="100000"/>
-              </a:lnSpc>
-              <a:spcBef>
-                <a:spcPts val="0"/>
-              </a:spcBef>
-              <a:spcAft>
-                <a:spcPts val="0"/>
-              </a:spcAft>
-              <a:buClrTx/>
-              <a:buSzTx/>
-              <a:buFontTx/>
-              <a:buNone/>
-              <a:tabLst/>
-              <a:defRPr/>
-            </a:pPr>
-            <a:endParaRPr lang="en-US" sz="3600" dirty="0"/>
-          </a:p>
-          <a:p>
-            <a:pPr marL="0" marR="0" lvl="0" indent="0" algn="l" defTabSz="914400" rtl="0" eaLnBrk="1" fontAlgn="auto" latinLnBrk="0" hangingPunct="1">
-              <a:lnSpc>
-                <a:spcPct val="100000"/>
-              </a:lnSpc>
-              <a:spcBef>
-                <a:spcPts val="0"/>
-              </a:spcBef>
-              <a:spcAft>
-                <a:spcPts val="0"/>
-              </a:spcAft>
-              <a:buClrTx/>
-              <a:buSzTx/>
-              <a:buFontTx/>
-              <a:buNone/>
-              <a:tabLst/>
-              <a:defRPr/>
-            </a:pPr>
-            <a:r>
-              <a:rPr lang="en-US" sz="3600" dirty="0"/>
-              <a:t>Here are some obvious ones  &lt;read slide&gt;</a:t>
-            </a:r>
-          </a:p>
-          <a:p>
-            <a:pPr marL="0" marR="0" lvl="0" indent="0" algn="l" defTabSz="914400" rtl="0" eaLnBrk="1" fontAlgn="auto" latinLnBrk="0" hangingPunct="1">
-              <a:lnSpc>
-                <a:spcPct val="100000"/>
-              </a:lnSpc>
-              <a:spcBef>
-                <a:spcPts val="0"/>
-              </a:spcBef>
-              <a:spcAft>
-                <a:spcPts val="0"/>
-              </a:spcAft>
-              <a:buClrTx/>
-              <a:buSzTx/>
-              <a:buFontTx/>
-              <a:buNone/>
-              <a:tabLst/>
-              <a:defRPr/>
-            </a:pPr>
-            <a:endParaRPr lang="en-US" sz="3600" dirty="0"/>
-          </a:p>
-          <a:p>
-            <a:pPr marL="0" marR="0" lvl="0" indent="0" algn="l" defTabSz="914400" rtl="0" eaLnBrk="1" fontAlgn="auto" latinLnBrk="0" hangingPunct="1">
-              <a:lnSpc>
-                <a:spcPct val="100000"/>
-              </a:lnSpc>
-              <a:spcBef>
-                <a:spcPts val="0"/>
-              </a:spcBef>
-              <a:spcAft>
-                <a:spcPts val="0"/>
-              </a:spcAft>
-              <a:buClrTx/>
-              <a:buSzTx/>
-              <a:buFontTx/>
-              <a:buNone/>
-              <a:tabLst/>
-              <a:defRPr/>
-            </a:pPr>
-            <a:endParaRPr lang="en-US" sz="3600" dirty="0"/>
-          </a:p>
-          <a:p>
-            <a:pPr marL="0" marR="0" lvl="0" indent="0" algn="l" defTabSz="914400" rtl="0" eaLnBrk="1" fontAlgn="auto" latinLnBrk="0" hangingPunct="1">
-              <a:lnSpc>
-                <a:spcPct val="100000"/>
-              </a:lnSpc>
-              <a:spcBef>
-                <a:spcPts val="0"/>
-              </a:spcBef>
-              <a:spcAft>
-                <a:spcPts val="0"/>
-              </a:spcAft>
-              <a:buClrTx/>
-              <a:buSzTx/>
-              <a:buFontTx/>
-              <a:buNone/>
-              <a:tabLst/>
-              <a:defRPr/>
-            </a:pPr>
-            <a:endParaRPr lang="en-US" sz="3600" dirty="0"/>
+            <a:endParaRPr lang="en-US" dirty="0"/>
           </a:p>
         </p:txBody>
       </p:sp>
@@ -7411,7 +7198,7 @@
           <a:p>
             <a:fld id="{07937F07-1250-4CCE-B198-1B2887014F41}" type="slidenum">
               <a:rPr lang="en-US" smtClean="0"/>
-              <a:t>26</a:t>
+              <a:t>24</a:t>
             </a:fld>
             <a:endParaRPr lang="en-US"/>
           </a:p>
@@ -7420,7 +7207,7 @@
     </p:spTree>
     <p:extLst>
       <p:ext uri="{BB962C8B-B14F-4D97-AF65-F5344CB8AC3E}">
-        <p14:creationId xmlns:p14="http://schemas.microsoft.com/office/powerpoint/2010/main" val="1345260318"/>
+        <p14:creationId xmlns:p14="http://schemas.microsoft.com/office/powerpoint/2010/main" val="3305253114"/>
       </p:ext>
     </p:extLst>
   </p:cSld>
@@ -7474,31 +7261,10 @@
           <a:bodyPr/>
           <a:lstStyle/>
           <a:p>
-            <a:pPr marL="0" marR="0" lvl="0" indent="0" algn="l" defTabSz="914400" rtl="0" eaLnBrk="1" fontAlgn="auto" latinLnBrk="0" hangingPunct="1">
-              <a:lnSpc>
-                <a:spcPct val="100000"/>
-              </a:lnSpc>
-              <a:spcBef>
-                <a:spcPts val="0"/>
-              </a:spcBef>
-              <a:spcAft>
-                <a:spcPts val="0"/>
-              </a:spcAft>
-              <a:buClrTx/>
-              <a:buSzTx/>
-              <a:buFontTx/>
-              <a:buNone/>
-              <a:tabLst/>
-              <a:defRPr/>
-            </a:pPr>
-            <a:r>
-              <a:rPr lang="en-US" i="0" dirty="0"/>
-              <a:t>For example, one high-level goal is to say “I want performance”. But what does performance mean? You probably mean to say that you expect that the system has some particular capacity (in terms of simultaneous users), who can simultaneously have their requests satisfied within some response time. That’s still not the whole picture though, because you didn’t specify the efficiency of your system: what hardware resources does it use to achieve that performance?</a:t>
-            </a:r>
-            <a:endParaRPr lang="en-US" dirty="0"/>
-          </a:p>
-          <a:p>
-            <a:endParaRPr lang="en-US" dirty="0"/>
+            <a:r>
+              <a:rPr lang="en-US" dirty="0"/>
+              <a:t>What do you think of these COSs?  Are they all essential?  Can you think of any satisfaction conditions that might be desirable, but not essential?  What conditions might you want "in the next version" (those would be extensions).</a:t>
+            </a:r>
           </a:p>
         </p:txBody>
       </p:sp>
@@ -7519,7 +7285,7 @@
           <a:p>
             <a:fld id="{07937F07-1250-4CCE-B198-1B2887014F41}" type="slidenum">
               <a:rPr lang="en-US" smtClean="0"/>
-              <a:t>27</a:t>
+              <a:t>26</a:t>
             </a:fld>
             <a:endParaRPr lang="en-US"/>
           </a:p>
@@ -7528,7 +7294,7 @@
     </p:spTree>
     <p:extLst>
       <p:ext uri="{BB962C8B-B14F-4D97-AF65-F5344CB8AC3E}">
-        <p14:creationId xmlns:p14="http://schemas.microsoft.com/office/powerpoint/2010/main" val="1209461942"/>
+        <p14:creationId xmlns:p14="http://schemas.microsoft.com/office/powerpoint/2010/main" val="2313477615"/>
       </p:ext>
     </p:extLst>
   </p:cSld>
@@ -7600,8 +7366,8 @@
               <a:defRPr/>
             </a:pPr>
             <a:r>
-              <a:rPr lang="en-US" i="0" dirty="0"/>
-              <a:t>Here are some other categories of non-functional requirements.</a:t>
+              <a:rPr lang="en-US" sz="3600" dirty="0"/>
+              <a:t>What we've talked about so far are called "functional requirements"-- the minimum functions that a system must be able to perform.</a:t>
             </a:r>
           </a:p>
           <a:p>
@@ -7622,7 +7388,185 @@
               <a:tabLst/>
               <a:defRPr/>
             </a:pPr>
-            <a:endParaRPr lang="en-US" i="0" dirty="0"/>
+            <a:endParaRPr lang="en-US" sz="3600" dirty="0"/>
+          </a:p>
+          <a:p>
+            <a:pPr marL="0" marR="0" lvl="0" indent="0" algn="l" defTabSz="914400" rtl="0" eaLnBrk="1" fontAlgn="auto" latinLnBrk="0" hangingPunct="1">
+              <a:lnSpc>
+                <a:spcPct val="100000"/>
+              </a:lnSpc>
+              <a:spcBef>
+                <a:spcPts val="0"/>
+              </a:spcBef>
+              <a:spcAft>
+                <a:spcPts val="0"/>
+              </a:spcAft>
+              <a:buClrTx/>
+              <a:buSzTx/>
+              <a:buFontTx/>
+              <a:buNone/>
+              <a:tabLst/>
+              <a:defRPr/>
+            </a:pPr>
+            <a:r>
+              <a:rPr lang="en-US" sz="3600" dirty="0"/>
+              <a:t>But there are other kinds of requirements.  These are called "non-functional" requirements.</a:t>
+            </a:r>
+          </a:p>
+          <a:p>
+            <a:pPr marL="0" marR="0" lvl="0" indent="0" algn="l" defTabSz="914400" rtl="0" eaLnBrk="1" fontAlgn="auto" latinLnBrk="0" hangingPunct="1">
+              <a:lnSpc>
+                <a:spcPct val="100000"/>
+              </a:lnSpc>
+              <a:spcBef>
+                <a:spcPts val="0"/>
+              </a:spcBef>
+              <a:spcAft>
+                <a:spcPts val="0"/>
+              </a:spcAft>
+              <a:buClrTx/>
+              <a:buSzTx/>
+              <a:buFontTx/>
+              <a:buNone/>
+              <a:tabLst/>
+              <a:defRPr/>
+            </a:pPr>
+            <a:endParaRPr lang="en-US" sz="3600" dirty="0"/>
+          </a:p>
+          <a:p>
+            <a:pPr marL="0" marR="0" lvl="0" indent="0" algn="l" defTabSz="914400" rtl="0" eaLnBrk="1" fontAlgn="auto" latinLnBrk="0" hangingPunct="1">
+              <a:lnSpc>
+                <a:spcPct val="100000"/>
+              </a:lnSpc>
+              <a:spcBef>
+                <a:spcPts val="0"/>
+              </a:spcBef>
+              <a:spcAft>
+                <a:spcPts val="0"/>
+              </a:spcAft>
+              <a:buClrTx/>
+              <a:buSzTx/>
+              <a:buFontTx/>
+              <a:buNone/>
+              <a:tabLst/>
+              <a:defRPr/>
+            </a:pPr>
+            <a:r>
+              <a:rPr lang="en-US" sz="3600" dirty="0"/>
+              <a:t>Non-functional requirements capture the </a:t>
+            </a:r>
+            <a:r>
+              <a:rPr lang="en-US" sz="3600" i="1" dirty="0"/>
+              <a:t>quality goals</a:t>
+            </a:r>
+            <a:r>
+              <a:rPr lang="en-US" sz="3600" i="0" dirty="0"/>
+              <a:t> of a system. </a:t>
+            </a:r>
+            <a:endParaRPr lang="en-US" sz="3600" dirty="0"/>
+          </a:p>
+          <a:p>
+            <a:pPr marL="0" marR="0" lvl="0" indent="0" algn="l" defTabSz="914400" rtl="0" eaLnBrk="1" fontAlgn="auto" latinLnBrk="0" hangingPunct="1">
+              <a:lnSpc>
+                <a:spcPct val="100000"/>
+              </a:lnSpc>
+              <a:spcBef>
+                <a:spcPts val="0"/>
+              </a:spcBef>
+              <a:spcAft>
+                <a:spcPts val="0"/>
+              </a:spcAft>
+              <a:buClrTx/>
+              <a:buSzTx/>
+              <a:buFontTx/>
+              <a:buNone/>
+              <a:tabLst/>
+              <a:defRPr/>
+            </a:pPr>
+            <a:endParaRPr lang="en-US" sz="3600" dirty="0"/>
+          </a:p>
+          <a:p>
+            <a:pPr marL="0" marR="0" lvl="0" indent="0" algn="l" defTabSz="914400" rtl="0" eaLnBrk="1" fontAlgn="auto" latinLnBrk="0" hangingPunct="1">
+              <a:lnSpc>
+                <a:spcPct val="100000"/>
+              </a:lnSpc>
+              <a:spcBef>
+                <a:spcPts val="0"/>
+              </a:spcBef>
+              <a:spcAft>
+                <a:spcPts val="0"/>
+              </a:spcAft>
+              <a:buClrTx/>
+              <a:buSzTx/>
+              <a:buFontTx/>
+              <a:buNone/>
+              <a:tabLst/>
+              <a:defRPr/>
+            </a:pPr>
+            <a:r>
+              <a:rPr lang="en-US" sz="3600" dirty="0"/>
+              <a:t>Here are some obvious ones  &lt;read slide&gt;</a:t>
+            </a:r>
+          </a:p>
+          <a:p>
+            <a:pPr marL="0" marR="0" lvl="0" indent="0" algn="l" defTabSz="914400" rtl="0" eaLnBrk="1" fontAlgn="auto" latinLnBrk="0" hangingPunct="1">
+              <a:lnSpc>
+                <a:spcPct val="100000"/>
+              </a:lnSpc>
+              <a:spcBef>
+                <a:spcPts val="0"/>
+              </a:spcBef>
+              <a:spcAft>
+                <a:spcPts val="0"/>
+              </a:spcAft>
+              <a:buClrTx/>
+              <a:buSzTx/>
+              <a:buFontTx/>
+              <a:buNone/>
+              <a:tabLst/>
+              <a:defRPr/>
+            </a:pPr>
+            <a:endParaRPr lang="en-US" sz="3600" dirty="0"/>
+          </a:p>
+          <a:p>
+            <a:pPr marL="0" marR="0" lvl="0" indent="0" algn="l" defTabSz="914400" rtl="0" eaLnBrk="1" fontAlgn="auto" latinLnBrk="0" hangingPunct="1">
+              <a:lnSpc>
+                <a:spcPct val="100000"/>
+              </a:lnSpc>
+              <a:spcBef>
+                <a:spcPts val="0"/>
+              </a:spcBef>
+              <a:spcAft>
+                <a:spcPts val="0"/>
+              </a:spcAft>
+              <a:buClrTx/>
+              <a:buSzTx/>
+              <a:buFontTx/>
+              <a:buNone/>
+              <a:tabLst/>
+              <a:defRPr/>
+            </a:pPr>
+            <a:endParaRPr lang="en-US" sz="3600" dirty="0"/>
+          </a:p>
+          <a:p>
+            <a:pPr marL="0" marR="0" lvl="0" indent="0" algn="l" defTabSz="914400" rtl="0" eaLnBrk="1" fontAlgn="auto" latinLnBrk="0" hangingPunct="1">
+              <a:lnSpc>
+                <a:spcPct val="100000"/>
+              </a:lnSpc>
+              <a:spcBef>
+                <a:spcPts val="0"/>
+              </a:spcBef>
+              <a:spcAft>
+                <a:spcPts val="0"/>
+              </a:spcAft>
+              <a:buClrTx/>
+              <a:buSzTx/>
+              <a:buFontTx/>
+              <a:buNone/>
+              <a:tabLst/>
+              <a:defRPr/>
+            </a:pPr>
+            <a:endParaRPr lang="en-US" sz="3600" dirty="0"/>
           </a:p>
         </p:txBody>
       </p:sp>
@@ -7643,7 +7587,7 @@
           <a:p>
             <a:fld id="{07937F07-1250-4CCE-B198-1B2887014F41}" type="slidenum">
               <a:rPr lang="en-US" smtClean="0"/>
-              <a:t>28</a:t>
+              <a:t>27</a:t>
             </a:fld>
             <a:endParaRPr lang="en-US"/>
           </a:p>
@@ -7652,7 +7596,7 @@
     </p:spTree>
     <p:extLst>
       <p:ext uri="{BB962C8B-B14F-4D97-AF65-F5344CB8AC3E}">
-        <p14:creationId xmlns:p14="http://schemas.microsoft.com/office/powerpoint/2010/main" val="1539519105"/>
+        <p14:creationId xmlns:p14="http://schemas.microsoft.com/office/powerpoint/2010/main" val="1345260318"/>
       </p:ext>
     </p:extLst>
   </p:cSld>
@@ -7808,52 +7752,13 @@
               <a:defRPr/>
             </a:pPr>
             <a:r>
-              <a:rPr lang="en-US" dirty="0"/>
-              <a:t>Non-functional requirements might also impact the static existence of the system, or its evolution.</a:t>
-            </a:r>
-          </a:p>
-          <a:p>
-            <a:pPr marL="0" marR="0" lvl="0" indent="0" algn="l" defTabSz="914400" rtl="0" eaLnBrk="1" fontAlgn="auto" latinLnBrk="0" hangingPunct="1">
-              <a:lnSpc>
-                <a:spcPct val="100000"/>
-              </a:lnSpc>
-              <a:spcBef>
-                <a:spcPts val="0"/>
-              </a:spcBef>
-              <a:spcAft>
-                <a:spcPts val="0"/>
-              </a:spcAft>
-              <a:buClrTx/>
-              <a:buSzTx/>
-              <a:buFontTx/>
-              <a:buNone/>
-              <a:tabLst/>
-              <a:defRPr/>
-            </a:pPr>
+              <a:rPr lang="en-US" i="0" dirty="0"/>
+              <a:t>For example, one high-level goal is to say “I want performance”. But what does performance mean? You probably mean to say that you expect that the system has some particular capacity (in terms of simultaneous users), who can simultaneously have their requests satisfied within some response time. That’s still not the whole picture though, because you didn’t specify the efficiency of your system: what hardware resources does it use to achieve that performance?</a:t>
+            </a:r>
             <a:endParaRPr lang="en-US" dirty="0"/>
           </a:p>
           <a:p>
-            <a:pPr marL="0" marR="0" lvl="0" indent="0" algn="l" defTabSz="914400" rtl="0" eaLnBrk="1" fontAlgn="auto" latinLnBrk="0" hangingPunct="1">
-              <a:lnSpc>
-                <a:spcPct val="100000"/>
-              </a:lnSpc>
-              <a:spcBef>
-                <a:spcPts val="0"/>
-              </a:spcBef>
-              <a:spcAft>
-                <a:spcPts val="0"/>
-              </a:spcAft>
-              <a:buClrTx/>
-              <a:buSzTx/>
-              <a:buFontTx/>
-              <a:buNone/>
-              <a:tabLst/>
-              <a:defRPr/>
-            </a:pPr>
-            <a:r>
-              <a:rPr lang="en-US" dirty="0"/>
-              <a:t>For example, if a customer intends for your software to be particularly long-lasting, and to be able to be extended – this needs to be said. Similarly, if there are specific testing requirements that your customer needs to comply with, there may be testability requirements, that define the effort needed to test the behaviors of that system.</a:t>
-            </a:r>
+            <a:endParaRPr lang="en-US" dirty="0"/>
           </a:p>
         </p:txBody>
       </p:sp>
@@ -7874,7 +7779,7 @@
           <a:p>
             <a:fld id="{07937F07-1250-4CCE-B198-1B2887014F41}" type="slidenum">
               <a:rPr lang="en-US" smtClean="0"/>
-              <a:t>29</a:t>
+              <a:t>28</a:t>
             </a:fld>
             <a:endParaRPr lang="en-US"/>
           </a:p>
@@ -7883,7 +7788,7 @@
     </p:spTree>
     <p:extLst>
       <p:ext uri="{BB962C8B-B14F-4D97-AF65-F5344CB8AC3E}">
-        <p14:creationId xmlns:p14="http://schemas.microsoft.com/office/powerpoint/2010/main" val="3523526305"/>
+        <p14:creationId xmlns:p14="http://schemas.microsoft.com/office/powerpoint/2010/main" val="1209461942"/>
       </p:ext>
     </p:extLst>
   </p:cSld>
@@ -7937,93 +7842,6 @@
           <a:bodyPr/>
           <a:lstStyle/>
           <a:p>
-            <a:r>
-              <a:rPr lang="en-US" dirty="0"/>
-              <a:t>INVEST is a popular mnemonic for describing what makes a good user story</a:t>
-            </a:r>
-          </a:p>
-          <a:p>
-            <a:endParaRPr lang="en-US" dirty="0"/>
-          </a:p>
-          <a:p>
-            <a:r>
-              <a:rPr lang="en-US" dirty="0"/>
-              <a:t>Independent – Stories should not be coupled between each other, except where obviously necessary. Want to make it so that a user can examine a story on its own</a:t>
-            </a:r>
-          </a:p>
-          <a:p>
-            <a:br>
-              <a:rPr lang="en-US" dirty="0"/>
-            </a:br>
-            <a:r>
-              <a:rPr lang="en-US" dirty="0"/>
-              <a:t>Negotiable – Best stories are result of a negotiation between a client and a developer – how do we come to some mutual agreement about what we are going to build, and why? Goal is to develop what the customer needs</a:t>
-            </a:r>
-          </a:p>
-          <a:p>
-            <a:endParaRPr lang="en-US" dirty="0"/>
-          </a:p>
-          <a:p>
-            <a:r>
-              <a:rPr lang="en-US" dirty="0"/>
-              <a:t>Valuable – Each story should have some benefit that the client can recognize. Value might include value to your business, not just value to the user.</a:t>
-            </a:r>
-          </a:p>
-          <a:p>
-            <a:endParaRPr lang="en-US" dirty="0"/>
-          </a:p>
-          <a:p>
-            <a:r>
-              <a:rPr lang="en-US" dirty="0" err="1"/>
-              <a:t>Estimatable</a:t>
-            </a:r>
-            <a:r>
-              <a:rPr lang="en-US" dirty="0"/>
-              <a:t> – As we will see in a bit, being able to estimate how long it will take to implement a user story is key to determining a reasonable scope for your project</a:t>
-            </a:r>
-          </a:p>
-          <a:p>
-            <a:endParaRPr lang="en-US" dirty="0"/>
-          </a:p>
-          <a:p>
-            <a:r>
-              <a:rPr lang="en-US" dirty="0"/>
-              <a:t>Small – A rule of thumb is to average 3-4 days of work per-story. Again, we’ll see this fit in with estimation.</a:t>
-            </a:r>
-          </a:p>
-          <a:p>
-            <a:endParaRPr lang="en-US" dirty="0"/>
-          </a:p>
-          <a:p>
-            <a:r>
-              <a:rPr lang="en-US" dirty="0"/>
-              <a:t>Testable – There must be some way to judge completion: for the person implementing the software, and for the end-user. </a:t>
-            </a:r>
-          </a:p>
-          <a:p>
-            <a:endParaRPr lang="en-US" dirty="0"/>
-          </a:p>
-          <a:p>
-            <a:r>
-              <a:rPr lang="en-US" dirty="0"/>
-              <a:t>https://</a:t>
-            </a:r>
-            <a:r>
-              <a:rPr lang="en-US" dirty="0" err="1"/>
-              <a:t>agileforall.com</a:t>
-            </a:r>
-            <a:r>
-              <a:rPr lang="en-US" dirty="0"/>
-              <a:t>/new-to-agile-invest-in-good-user-stories/</a:t>
-            </a:r>
-          </a:p>
-          <a:p>
-            <a:endParaRPr lang="en-US" dirty="0"/>
-          </a:p>
-          <a:p>
-            <a:endParaRPr lang="en-US" dirty="0"/>
-          </a:p>
-          <a:p>
             <a:pPr marL="0" marR="0" lvl="0" indent="0" algn="l" defTabSz="914400" rtl="0" eaLnBrk="1" fontAlgn="auto" latinLnBrk="0" hangingPunct="1">
               <a:lnSpc>
                 <a:spcPct val="100000"/>
@@ -8042,9 +7860,29 @@
               <a:defRPr/>
             </a:pPr>
             <a:r>
-              <a:rPr lang="en-US" dirty="0"/>
-              <a:t>… Let’s see an example and work through some of the tricky bits</a:t>
-            </a:r>
+              <a:rPr lang="en-US" i="0" dirty="0"/>
+              <a:t>Here are some other categories of non-functional requirements.</a:t>
+            </a:r>
+          </a:p>
+          <a:p>
+            <a:pPr marL="0" marR="0" lvl="0" indent="0" algn="l" defTabSz="914400" rtl="0" eaLnBrk="1" fontAlgn="auto" latinLnBrk="0" hangingPunct="1">
+              <a:lnSpc>
+                <a:spcPct val="100000"/>
+              </a:lnSpc>
+              <a:spcBef>
+                <a:spcPts val="0"/>
+              </a:spcBef>
+              <a:spcAft>
+                <a:spcPts val="0"/>
+              </a:spcAft>
+              <a:buClrTx/>
+              <a:buSzTx/>
+              <a:buFontTx/>
+              <a:buNone/>
+              <a:tabLst/>
+              <a:defRPr/>
+            </a:pPr>
+            <a:endParaRPr lang="en-US" i="0" dirty="0"/>
           </a:p>
         </p:txBody>
       </p:sp>
@@ -8065,7 +7903,7 @@
           <a:p>
             <a:fld id="{07937F07-1250-4CCE-B198-1B2887014F41}" type="slidenum">
               <a:rPr lang="en-US" smtClean="0"/>
-              <a:t>30</a:t>
+              <a:t>29</a:t>
             </a:fld>
             <a:endParaRPr lang="en-US"/>
           </a:p>
@@ -8074,7 +7912,7 @@
     </p:spTree>
     <p:extLst>
       <p:ext uri="{BB962C8B-B14F-4D97-AF65-F5344CB8AC3E}">
-        <p14:creationId xmlns:p14="http://schemas.microsoft.com/office/powerpoint/2010/main" val="1695675977"/>
+        <p14:creationId xmlns:p14="http://schemas.microsoft.com/office/powerpoint/2010/main" val="1539519105"/>
       </p:ext>
     </p:extLst>
   </p:cSld>
@@ -8128,7 +7966,70 @@
           <a:bodyPr/>
           <a:lstStyle/>
           <a:p>
+            <a:pPr marL="0" marR="0" lvl="0" indent="0" algn="l" defTabSz="914400" rtl="0" eaLnBrk="1" fontAlgn="auto" latinLnBrk="0" hangingPunct="1">
+              <a:lnSpc>
+                <a:spcPct val="100000"/>
+              </a:lnSpc>
+              <a:spcBef>
+                <a:spcPts val="0"/>
+              </a:spcBef>
+              <a:spcAft>
+                <a:spcPts val="0"/>
+              </a:spcAft>
+              <a:buClrTx/>
+              <a:buSzTx/>
+              <a:buFontTx/>
+              <a:buNone/>
+              <a:tabLst/>
+              <a:defRPr/>
+            </a:pPr>
+            <a:r>
+              <a:rPr lang="en-US" dirty="0"/>
+              <a:t>Non-functional requirements might also impact the static existence of the system, or its evolution.</a:t>
+            </a:r>
+          </a:p>
+          <a:p>
+            <a:pPr marL="0" marR="0" lvl="0" indent="0" algn="l" defTabSz="914400" rtl="0" eaLnBrk="1" fontAlgn="auto" latinLnBrk="0" hangingPunct="1">
+              <a:lnSpc>
+                <a:spcPct val="100000"/>
+              </a:lnSpc>
+              <a:spcBef>
+                <a:spcPts val="0"/>
+              </a:spcBef>
+              <a:spcAft>
+                <a:spcPts val="0"/>
+              </a:spcAft>
+              <a:buClrTx/>
+              <a:buSzTx/>
+              <a:buFontTx/>
+              <a:buNone/>
+              <a:tabLst/>
+              <a:defRPr/>
+            </a:pPr>
             <a:endParaRPr lang="en-US" dirty="0"/>
+          </a:p>
+          <a:p>
+            <a:pPr marL="0" marR="0" lvl="0" indent="0" algn="l" defTabSz="914400" rtl="0" eaLnBrk="1" fontAlgn="auto" latinLnBrk="0" hangingPunct="1">
+              <a:lnSpc>
+                <a:spcPct val="100000"/>
+              </a:lnSpc>
+              <a:spcBef>
+                <a:spcPts val="0"/>
+              </a:spcBef>
+              <a:spcAft>
+                <a:spcPts val="0"/>
+              </a:spcAft>
+              <a:buClrTx/>
+              <a:buSzTx/>
+              <a:buFontTx/>
+              <a:buNone/>
+              <a:tabLst/>
+              <a:defRPr/>
+            </a:pPr>
+            <a:r>
+              <a:rPr lang="en-US" dirty="0"/>
+              <a:t>For example, if a customer intends for your software to be particularly long-lasting, and to be able to be extended – this needs to be said. Similarly, if there are specific testing requirements that your customer needs to comply with, there may be testability requirements, that define the effort needed to test the behaviors of that system.</a:t>
+            </a:r>
           </a:p>
         </p:txBody>
       </p:sp>
@@ -8149,7 +8050,286 @@
           <a:p>
             <a:fld id="{07937F07-1250-4CCE-B198-1B2887014F41}" type="slidenum">
               <a:rPr lang="en-US" smtClean="0"/>
+              <a:t>30</a:t>
+            </a:fld>
+            <a:endParaRPr lang="en-US"/>
+          </a:p>
+        </p:txBody>
+      </p:sp>
+    </p:spTree>
+    <p:extLst>
+      <p:ext uri="{BB962C8B-B14F-4D97-AF65-F5344CB8AC3E}">
+        <p14:creationId xmlns:p14="http://schemas.microsoft.com/office/powerpoint/2010/main" val="3523526305"/>
+      </p:ext>
+    </p:extLst>
+  </p:cSld>
+  <p:clrMapOvr>
+    <a:masterClrMapping/>
+  </p:clrMapOvr>
+</p:notes>
+</file>
+
+<file path=ppt/notesSlides/notesSlide23.xml><?xml version="1.0" encoding="utf-8"?>
+<p:notes xmlns:a="http://schemas.openxmlformats.org/drawingml/2006/main" xmlns:r="http://schemas.openxmlformats.org/officeDocument/2006/relationships" xmlns:p="http://schemas.openxmlformats.org/presentationml/2006/main">
+  <p:cSld>
+    <p:spTree>
+      <p:nvGrpSpPr>
+        <p:cNvPr id="1" name=""/>
+        <p:cNvGrpSpPr/>
+        <p:nvPr/>
+      </p:nvGrpSpPr>
+      <p:grpSpPr>
+        <a:xfrm>
+          <a:off x="0" y="0"/>
+          <a:ext cx="0" cy="0"/>
+          <a:chOff x="0" y="0"/>
+          <a:chExt cx="0" cy="0"/>
+        </a:xfrm>
+      </p:grpSpPr>
+      <p:sp>
+        <p:nvSpPr>
+          <p:cNvPr id="2" name="Slide Image Placeholder 1"/>
+          <p:cNvSpPr>
+            <a:spLocks noGrp="1" noRot="1" noChangeAspect="1"/>
+          </p:cNvSpPr>
+          <p:nvPr>
+            <p:ph type="sldImg"/>
+          </p:nvPr>
+        </p:nvSpPr>
+        <p:spPr/>
+      </p:sp>
+      <p:sp>
+        <p:nvSpPr>
+          <p:cNvPr id="3" name="Notes Placeholder 2"/>
+          <p:cNvSpPr>
+            <a:spLocks noGrp="1"/>
+          </p:cNvSpPr>
+          <p:nvPr>
+            <p:ph type="body" idx="1"/>
+          </p:nvPr>
+        </p:nvSpPr>
+        <p:spPr/>
+        <p:txBody>
+          <a:bodyPr/>
+          <a:lstStyle/>
+          <a:p>
+            <a:r>
+              <a:rPr lang="en-US" dirty="0"/>
+              <a:t>INVEST is a popular mnemonic for describing what makes a good user story</a:t>
+            </a:r>
+          </a:p>
+          <a:p>
+            <a:endParaRPr lang="en-US" dirty="0"/>
+          </a:p>
+          <a:p>
+            <a:r>
+              <a:rPr lang="en-US" dirty="0"/>
+              <a:t>Independent – Stories should not be coupled between each other, except where obviously necessary. Want to make it so that a user can examine a story on its own</a:t>
+            </a:r>
+          </a:p>
+          <a:p>
+            <a:br>
+              <a:rPr lang="en-US" dirty="0"/>
+            </a:br>
+            <a:r>
+              <a:rPr lang="en-US" dirty="0"/>
+              <a:t>Negotiable – Best stories are result of a negotiation between a client and a developer – how do we come to some mutual agreement about what we are going to build, and why? Goal is to develop what the customer needs</a:t>
+            </a:r>
+          </a:p>
+          <a:p>
+            <a:endParaRPr lang="en-US" dirty="0"/>
+          </a:p>
+          <a:p>
+            <a:r>
+              <a:rPr lang="en-US" dirty="0"/>
+              <a:t>Valuable – Each story should have some benefit that the client can recognize. Value might include value to your business, not just value to the user.</a:t>
+            </a:r>
+          </a:p>
+          <a:p>
+            <a:endParaRPr lang="en-US" dirty="0"/>
+          </a:p>
+          <a:p>
+            <a:r>
+              <a:rPr lang="en-US" dirty="0"/>
+              <a:t>Estimable (that is, </a:t>
+            </a:r>
+            <a:r>
+              <a:rPr lang="en-US" dirty="0" err="1"/>
+              <a:t>estimatable</a:t>
+            </a:r>
+            <a:r>
+              <a:rPr lang="en-US" dirty="0"/>
+              <a:t>) – As we will see in a bit, being able to estimate how long it will take to implement a user story is key to determining a reasonable scope for your project</a:t>
+            </a:r>
+          </a:p>
+          <a:p>
+            <a:endParaRPr lang="en-US" dirty="0"/>
+          </a:p>
+          <a:p>
+            <a:r>
+              <a:rPr lang="en-US" dirty="0"/>
+              <a:t>Small – In  the real world, a rule of thumb is to average 3-4 days of work per story for a full-time developer.  For our projects, it might be something a single student might be able to accomplish in a week, along with their other obligations as a student.</a:t>
+            </a:r>
+          </a:p>
+          <a:p>
+            <a:endParaRPr lang="en-US" dirty="0"/>
+          </a:p>
+          <a:p>
+            <a:r>
+              <a:rPr lang="en-US" dirty="0"/>
+              <a:t>Testable – There must be some way to judge completion: for the person implementing the software, and for the end-user. </a:t>
+            </a:r>
+          </a:p>
+          <a:p>
+            <a:endParaRPr lang="en-US" dirty="0"/>
+          </a:p>
+          <a:p>
+            <a:r>
+              <a:rPr lang="en-US" dirty="0"/>
+              <a:t>https://</a:t>
+            </a:r>
+            <a:r>
+              <a:rPr lang="en-US" dirty="0" err="1"/>
+              <a:t>agileforall.com</a:t>
+            </a:r>
+            <a:r>
+              <a:rPr lang="en-US" dirty="0"/>
+              <a:t>/new-to-agile-invest-in-good-user-stories/</a:t>
+            </a:r>
+          </a:p>
+          <a:p>
+            <a:endParaRPr lang="en-US" dirty="0"/>
+          </a:p>
+          <a:p>
+            <a:endParaRPr lang="en-US" dirty="0"/>
+          </a:p>
+          <a:p>
+            <a:pPr marL="0" marR="0" lvl="0" indent="0" algn="l" defTabSz="914400" rtl="0" eaLnBrk="1" fontAlgn="auto" latinLnBrk="0" hangingPunct="1">
+              <a:lnSpc>
+                <a:spcPct val="100000"/>
+              </a:lnSpc>
+              <a:spcBef>
+                <a:spcPts val="0"/>
+              </a:spcBef>
+              <a:spcAft>
+                <a:spcPts val="0"/>
+              </a:spcAft>
+              <a:buClrTx/>
+              <a:buSzTx/>
+              <a:buFontTx/>
+              <a:buNone/>
+              <a:tabLst/>
+              <a:defRPr/>
+            </a:pPr>
+            <a:r>
+              <a:rPr lang="en-US" dirty="0"/>
+              <a:t>… Let’s see an example and work through some of the tricky bits</a:t>
+            </a:r>
+          </a:p>
+        </p:txBody>
+      </p:sp>
+      <p:sp>
+        <p:nvSpPr>
+          <p:cNvPr id="4" name="Slide Number Placeholder 3"/>
+          <p:cNvSpPr>
+            <a:spLocks noGrp="1"/>
+          </p:cNvSpPr>
+          <p:nvPr>
+            <p:ph type="sldNum" sz="quarter" idx="5"/>
+          </p:nvPr>
+        </p:nvSpPr>
+        <p:spPr/>
+        <p:txBody>
+          <a:bodyPr/>
+          <a:lstStyle/>
+          <a:p>
+            <a:fld id="{07937F07-1250-4CCE-B198-1B2887014F41}" type="slidenum">
+              <a:rPr lang="en-US" smtClean="0"/>
               <a:t>31</a:t>
+            </a:fld>
+            <a:endParaRPr lang="en-US"/>
+          </a:p>
+        </p:txBody>
+      </p:sp>
+    </p:spTree>
+    <p:extLst>
+      <p:ext uri="{BB962C8B-B14F-4D97-AF65-F5344CB8AC3E}">
+        <p14:creationId xmlns:p14="http://schemas.microsoft.com/office/powerpoint/2010/main" val="1695675977"/>
+      </p:ext>
+    </p:extLst>
+  </p:cSld>
+  <p:clrMapOvr>
+    <a:masterClrMapping/>
+  </p:clrMapOvr>
+</p:notes>
+</file>
+
+<file path=ppt/notesSlides/notesSlide24.xml><?xml version="1.0" encoding="utf-8"?>
+<p:notes xmlns:a="http://schemas.openxmlformats.org/drawingml/2006/main" xmlns:r="http://schemas.openxmlformats.org/officeDocument/2006/relationships" xmlns:p="http://schemas.openxmlformats.org/presentationml/2006/main">
+  <p:cSld>
+    <p:spTree>
+      <p:nvGrpSpPr>
+        <p:cNvPr id="1" name=""/>
+        <p:cNvGrpSpPr/>
+        <p:nvPr/>
+      </p:nvGrpSpPr>
+      <p:grpSpPr>
+        <a:xfrm>
+          <a:off x="0" y="0"/>
+          <a:ext cx="0" cy="0"/>
+          <a:chOff x="0" y="0"/>
+          <a:chExt cx="0" cy="0"/>
+        </a:xfrm>
+      </p:grpSpPr>
+      <p:sp>
+        <p:nvSpPr>
+          <p:cNvPr id="2" name="Slide Image Placeholder 1"/>
+          <p:cNvSpPr>
+            <a:spLocks noGrp="1" noRot="1" noChangeAspect="1"/>
+          </p:cNvSpPr>
+          <p:nvPr>
+            <p:ph type="sldImg"/>
+          </p:nvPr>
+        </p:nvSpPr>
+        <p:spPr/>
+      </p:sp>
+      <p:sp>
+        <p:nvSpPr>
+          <p:cNvPr id="3" name="Notes Placeholder 2"/>
+          <p:cNvSpPr>
+            <a:spLocks noGrp="1"/>
+          </p:cNvSpPr>
+          <p:nvPr>
+            <p:ph type="body" idx="1"/>
+          </p:nvPr>
+        </p:nvSpPr>
+        <p:spPr/>
+        <p:txBody>
+          <a:bodyPr/>
+          <a:lstStyle/>
+          <a:p>
+            <a:endParaRPr lang="en-US" dirty="0"/>
+          </a:p>
+        </p:txBody>
+      </p:sp>
+      <p:sp>
+        <p:nvSpPr>
+          <p:cNvPr id="4" name="Slide Number Placeholder 3"/>
+          <p:cNvSpPr>
+            <a:spLocks noGrp="1"/>
+          </p:cNvSpPr>
+          <p:nvPr>
+            <p:ph type="sldNum" sz="quarter" idx="5"/>
+          </p:nvPr>
+        </p:nvSpPr>
+        <p:spPr/>
+        <p:txBody>
+          <a:bodyPr/>
+          <a:lstStyle/>
+          <a:p>
+            <a:fld id="{07937F07-1250-4CCE-B198-1B2887014F41}" type="slidenum">
+              <a:rPr lang="en-US" smtClean="0"/>
+              <a:t>32</a:t>
             </a:fld>
             <a:endParaRPr lang="en-US"/>
           </a:p>
@@ -8961,9 +9141,6 @@
             <a:endParaRPr lang="en-US" dirty="0"/>
           </a:p>
           <a:p>
-            <a:endParaRPr lang="en-US" dirty="0"/>
-          </a:p>
-          <a:p>
             <a:r>
               <a:rPr lang="en-US" dirty="0"/>
               <a:t>They do NOT directly describe the full behaviors of those capabilities.  For example: Under what circumstances should this capability be provided? What should happen if it can’t be provided?  These are details that will eventually need to be spelled out, but right now we want a bird's-eye view of the desired capabilities.</a:t>
@@ -9046,18 +9223,6 @@
               <a:rPr lang="en-US" dirty="0"/>
               <a:t>Why do we include the value? Because ultimately our goal with building software is presumably to deliver value – do something that helps some user accomplish some goal. That “something of value” is really what the requirement is. The customer probably doesn’t care to define every possible output for their system for every possible input – instead they just want to tell you what they want to have happen, in language that is as close to their own as possible.</a:t>
             </a:r>
-          </a:p>
-          <a:p>
-            <a:endParaRPr lang="en-US" dirty="0"/>
-          </a:p>
-          <a:p>
-            <a:endParaRPr lang="en-US" dirty="0"/>
-          </a:p>
-          <a:p>
-            <a:endParaRPr lang="en-US" dirty="0"/>
-          </a:p>
-          <a:p>
-            <a:endParaRPr lang="en-US" dirty="0"/>
           </a:p>
           <a:p>
             <a:endParaRPr lang="en-US" dirty="0"/>
@@ -9260,7 +9425,7 @@
           <a:p>
             <a:fld id="{5D2A64DE-480B-420F-9649-4F8E696E08E0}" type="datetime1">
               <a:rPr lang="en-US" smtClean="0"/>
-              <a:t>12/2/2024</a:t>
+              <a:t>12/26/2024</a:t>
             </a:fld>
             <a:endParaRPr lang="en-US"/>
           </a:p>
@@ -9584,7 +9749,7 @@
           <a:p>
             <a:fld id="{EA476A42-A091-4468-A075-64A31BE59948}" type="datetime1">
               <a:rPr lang="en-US" smtClean="0"/>
-              <a:t>12/2/2024</a:t>
+              <a:t>12/26/2024</a:t>
             </a:fld>
             <a:endParaRPr lang="en-US"/>
           </a:p>
@@ -9782,7 +9947,7 @@
           <a:p>
             <a:fld id="{0D3616D0-8311-4107-9726-6B805E7D05BA}" type="datetime1">
               <a:rPr lang="en-US" smtClean="0"/>
-              <a:t>12/2/2024</a:t>
+              <a:t>12/26/2024</a:t>
             </a:fld>
             <a:endParaRPr lang="en-US"/>
           </a:p>
@@ -9990,7 +10155,7 @@
           <a:p>
             <a:fld id="{3BC2557A-5C88-417A-A763-5AC779462A5F}" type="datetime1">
               <a:rPr lang="en-US" smtClean="0"/>
-              <a:t>12/2/2024</a:t>
+              <a:t>12/26/2024</a:t>
             </a:fld>
             <a:endParaRPr lang="en-US"/>
           </a:p>
@@ -10514,7 +10679,7 @@
           <a:p>
             <a:fld id="{07C7BFD4-467E-4EDE-93EA-052F5B39A4E5}" type="datetime1">
               <a:rPr lang="en-US" smtClean="0"/>
-              <a:t>12/2/2024</a:t>
+              <a:t>12/26/2024</a:t>
             </a:fld>
             <a:endParaRPr lang="en-US"/>
           </a:p>
@@ -10764,7 +10929,7 @@
           <a:p>
             <a:fld id="{07C7BFD4-467E-4EDE-93EA-052F5B39A4E5}" type="datetime1">
               <a:rPr lang="en-US" smtClean="0"/>
-              <a:t>12/2/2024</a:t>
+              <a:t>12/26/2024</a:t>
             </a:fld>
             <a:endParaRPr lang="en-US"/>
           </a:p>
@@ -10946,7 +11111,7 @@
           <a:p>
             <a:fld id="{109E55A0-C911-4F03-82FC-7E5926047D46}" type="datetime1">
               <a:rPr lang="en-US" smtClean="0"/>
-              <a:t>12/2/2024</a:t>
+              <a:t>12/26/2024</a:t>
             </a:fld>
             <a:endParaRPr lang="en-US"/>
           </a:p>
@@ -11259,7 +11424,7 @@
           <a:p>
             <a:fld id="{A533CBE2-D5BE-47AC-ADC2-9CDFC1D0CF90}" type="datetime1">
               <a:rPr lang="en-US" smtClean="0"/>
-              <a:t>12/2/2024</a:t>
+              <a:t>12/26/2024</a:t>
             </a:fld>
             <a:endParaRPr lang="en-US"/>
           </a:p>
@@ -11560,7 +11725,7 @@
           <a:p>
             <a:fld id="{39B7EDB1-CE74-4951-85A2-0B01C2128E28}" type="datetime1">
               <a:rPr lang="en-US" smtClean="0"/>
-              <a:t>12/2/2024</a:t>
+              <a:t>12/26/2024</a:t>
             </a:fld>
             <a:endParaRPr lang="en-US"/>
           </a:p>
@@ -12008,7 +12173,7 @@
           <a:p>
             <a:fld id="{2BC7EB92-A5C2-4807-A9DC-9EDE6CBFB241}" type="datetime1">
               <a:rPr lang="en-US" smtClean="0"/>
-              <a:t>12/2/2024</a:t>
+              <a:t>12/26/2024</a:t>
             </a:fld>
             <a:endParaRPr lang="en-US"/>
           </a:p>
@@ -12121,7 +12286,7 @@
           <a:p>
             <a:fld id="{2B7B7EE0-7771-4CD5-9B2B-3550753A54A1}" type="datetime1">
               <a:rPr lang="en-US" smtClean="0"/>
-              <a:t>12/2/2024</a:t>
+              <a:t>12/26/2024</a:t>
             </a:fld>
             <a:endParaRPr lang="en-US"/>
           </a:p>
@@ -12432,7 +12597,7 @@
           <a:p>
             <a:fld id="{F8B318B3-0E87-4416-A9B8-D891968C2727}" type="datetime1">
               <a:rPr lang="en-US" smtClean="0"/>
-              <a:t>12/2/2024</a:t>
+              <a:t>12/26/2024</a:t>
             </a:fld>
             <a:endParaRPr lang="en-US"/>
           </a:p>
@@ -12673,7 +12838,7 @@
           <a:p>
             <a:fld id="{54D997E8-DDEE-43F1-8D9B-F8A1E11DE488}" type="datetime1">
               <a:rPr lang="en-US" smtClean="0"/>
-              <a:t>12/2/2024</a:t>
+              <a:t>12/26/2024</a:t>
             </a:fld>
             <a:endParaRPr lang="en-US"/>
           </a:p>
@@ -14052,7 +14217,7 @@
             </a:r>
             <a:r>
               <a:rPr lang="en-US" dirty="0"/>
-              <a:t> describes a user story or COS that is desirable, but may not be achievable within the scope of the project.</a:t>
+              <a:t> describes a user story or COS that is may not be achievable within the scope of the project.  These might be things you'd want "in the next version".</a:t>
             </a:r>
           </a:p>
           <a:p>
@@ -14170,13 +14335,13 @@
           <a:p>
             <a:r>
               <a:rPr lang="en-US" dirty="0"/>
+              <a:t>The set of essential user stories constitutes the minimum viable product (MVP)</a:t>
+            </a:r>
+          </a:p>
+          <a:p>
+            <a:r>
+              <a:rPr lang="en-US" dirty="0"/>
               <a:t>A user story is "implemented " when all its essential COSs are implemented.</a:t>
-            </a:r>
-          </a:p>
-          <a:p>
-            <a:r>
-              <a:rPr lang="en-US" dirty="0"/>
-              <a:t>The set of essential user stories constitutes the minimum viable product (MVP)</a:t>
             </a:r>
           </a:p>
           <a:p>
@@ -14233,6 +14398,155 @@
 </file>
 
 <file path=ppt/slides/slide16.xml><?xml version="1.0" encoding="utf-8"?>
+<p:sld xmlns:a="http://schemas.openxmlformats.org/drawingml/2006/main" xmlns:r="http://schemas.openxmlformats.org/officeDocument/2006/relationships" xmlns:p="http://schemas.openxmlformats.org/presentationml/2006/main">
+  <p:cSld>
+    <p:spTree>
+      <p:nvGrpSpPr>
+        <p:cNvPr id="1" name=""/>
+        <p:cNvGrpSpPr/>
+        <p:nvPr/>
+      </p:nvGrpSpPr>
+      <p:grpSpPr>
+        <a:xfrm>
+          <a:off x="0" y="0"/>
+          <a:ext cx="0" cy="0"/>
+          <a:chOff x="0" y="0"/>
+          <a:chExt cx="0" cy="0"/>
+        </a:xfrm>
+      </p:grpSpPr>
+      <p:sp>
+        <p:nvSpPr>
+          <p:cNvPr id="2" name="Title 1">
+            <a:extLst>
+              <a:ext uri="{FF2B5EF4-FFF2-40B4-BE49-F238E27FC236}">
+                <a16:creationId xmlns:a16="http://schemas.microsoft.com/office/drawing/2014/main" id="{84224501-E998-B404-A794-D58E1744897A}"/>
+              </a:ext>
+            </a:extLst>
+          </p:cNvPr>
+          <p:cNvSpPr>
+            <a:spLocks noGrp="1"/>
+          </p:cNvSpPr>
+          <p:nvPr>
+            <p:ph type="title"/>
+          </p:nvPr>
+        </p:nvSpPr>
+        <p:spPr/>
+        <p:txBody>
+          <a:bodyPr/>
+          <a:lstStyle/>
+          <a:p>
+            <a:r>
+              <a:rPr lang="en-US" dirty="0"/>
+              <a:t>The MVP and Your Project Grade</a:t>
+            </a:r>
+          </a:p>
+        </p:txBody>
+      </p:sp>
+      <p:sp>
+        <p:nvSpPr>
+          <p:cNvPr id="3" name="Content Placeholder 2">
+            <a:extLst>
+              <a:ext uri="{FF2B5EF4-FFF2-40B4-BE49-F238E27FC236}">
+                <a16:creationId xmlns:a16="http://schemas.microsoft.com/office/drawing/2014/main" id="{584100D8-2FF6-6C62-D094-917FA47BDE00}"/>
+              </a:ext>
+            </a:extLst>
+          </p:cNvPr>
+          <p:cNvSpPr>
+            <a:spLocks noGrp="1"/>
+          </p:cNvSpPr>
+          <p:nvPr>
+            <p:ph idx="1"/>
+          </p:nvPr>
+        </p:nvSpPr>
+        <p:spPr/>
+        <p:txBody>
+          <a:bodyPr/>
+          <a:lstStyle/>
+          <a:p>
+            <a:r>
+              <a:rPr lang="en-US" dirty="0"/>
+              <a:t>On your project, you will get 200 points (out of a total of 400) for code submission:</a:t>
+            </a:r>
+          </a:p>
+          <a:p>
+            <a:pPr lvl="1"/>
+            <a:r>
+              <a:rPr lang="en-US" dirty="0"/>
+              <a:t>MVP (all essential user stories and their essential COSs delivered): 100 points</a:t>
+            </a:r>
+          </a:p>
+          <a:p>
+            <a:pPr lvl="1"/>
+            <a:r>
+              <a:rPr lang="en-US" dirty="0"/>
+              <a:t>Extra features (desirable and optional features): 50 points</a:t>
+            </a:r>
+          </a:p>
+          <a:p>
+            <a:pPr lvl="1"/>
+            <a:r>
+              <a:rPr lang="en-US" dirty="0"/>
+              <a:t>Testing: 50 points</a:t>
+            </a:r>
+          </a:p>
+          <a:p>
+            <a:r>
+              <a:rPr lang="en-US" dirty="0"/>
+              <a:t>SO: be realistic about what you call "essential" </a:t>
+            </a:r>
+            <a:r>
+              <a:rPr lang="en-US" dirty="0">
+                <a:sym typeface="Wingdings" panose="05000000000000000000" pitchFamily="2" charset="2"/>
+              </a:rPr>
+              <a:t></a:t>
+            </a:r>
+            <a:endParaRPr lang="en-US" dirty="0"/>
+          </a:p>
+        </p:txBody>
+      </p:sp>
+      <p:sp>
+        <p:nvSpPr>
+          <p:cNvPr id="4" name="Slide Number Placeholder 3">
+            <a:extLst>
+              <a:ext uri="{FF2B5EF4-FFF2-40B4-BE49-F238E27FC236}">
+                <a16:creationId xmlns:a16="http://schemas.microsoft.com/office/drawing/2014/main" id="{8B02FC29-7EE8-33D0-E834-599AE8F4DE98}"/>
+              </a:ext>
+            </a:extLst>
+          </p:cNvPr>
+          <p:cNvSpPr>
+            <a:spLocks noGrp="1"/>
+          </p:cNvSpPr>
+          <p:nvPr>
+            <p:ph type="sldNum" sz="quarter" idx="12"/>
+          </p:nvPr>
+        </p:nvSpPr>
+        <p:spPr/>
+        <p:txBody>
+          <a:bodyPr/>
+          <a:lstStyle/>
+          <a:p>
+            <a:fld id="{20F37917-FD3A-4669-9018-DA04BCDD3D75}" type="slidenum">
+              <a:rPr lang="en-US" smtClean="0"/>
+              <a:t>16</a:t>
+            </a:fld>
+            <a:endParaRPr lang="en-US"/>
+          </a:p>
+        </p:txBody>
+      </p:sp>
+    </p:spTree>
+    <p:extLst>
+      <p:ext uri="{BB962C8B-B14F-4D97-AF65-F5344CB8AC3E}">
+        <p14:creationId xmlns:p14="http://schemas.microsoft.com/office/powerpoint/2010/main" val="1885121727"/>
+      </p:ext>
+    </p:extLst>
+  </p:cSld>
+  <p:clrMapOvr>
+    <a:masterClrMapping/>
+  </p:clrMapOvr>
+</p:sld>
+</file>
+
+<file path=ppt/slides/slide17.xml><?xml version="1.0" encoding="utf-8"?>
 <p:sld xmlns:a="http://schemas.openxmlformats.org/drawingml/2006/main" xmlns:r="http://schemas.openxmlformats.org/officeDocument/2006/relationships" xmlns:p="http://schemas.openxmlformats.org/presentationml/2006/main">
   <p:cSld>
     <p:bg>
@@ -14546,7 +14860,7 @@
                   <a:spcPts val="600"/>
                 </a:spcAft>
               </a:pPr>
-              <a:t>16</a:t>
+              <a:t>17</a:t>
             </a:fld>
             <a:endParaRPr lang="en-US">
               <a:solidFill>
@@ -14560,121 +14874,6 @@
     <p:extLst>
       <p:ext uri="{BB962C8B-B14F-4D97-AF65-F5344CB8AC3E}">
         <p14:creationId xmlns:p14="http://schemas.microsoft.com/office/powerpoint/2010/main" val="1450389062"/>
-      </p:ext>
-    </p:extLst>
-  </p:cSld>
-  <p:clrMapOvr>
-    <a:masterClrMapping/>
-  </p:clrMapOvr>
-</p:sld>
-</file>
-
-<file path=ppt/slides/slide17.xml><?xml version="1.0" encoding="utf-8"?>
-<p:sld xmlns:a="http://schemas.openxmlformats.org/drawingml/2006/main" xmlns:r="http://schemas.openxmlformats.org/officeDocument/2006/relationships" xmlns:p="http://schemas.openxmlformats.org/presentationml/2006/main">
-  <p:cSld>
-    <p:spTree>
-      <p:nvGrpSpPr>
-        <p:cNvPr id="1" name=""/>
-        <p:cNvGrpSpPr/>
-        <p:nvPr/>
-      </p:nvGrpSpPr>
-      <p:grpSpPr>
-        <a:xfrm>
-          <a:off x="0" y="0"/>
-          <a:ext cx="0" cy="0"/>
-          <a:chOff x="0" y="0"/>
-          <a:chExt cx="0" cy="0"/>
-        </a:xfrm>
-      </p:grpSpPr>
-      <p:sp>
-        <p:nvSpPr>
-          <p:cNvPr id="2" name="Title 1">
-            <a:extLst>
-              <a:ext uri="{FF2B5EF4-FFF2-40B4-BE49-F238E27FC236}">
-                <a16:creationId xmlns:a16="http://schemas.microsoft.com/office/drawing/2014/main" id="{605A4A5A-ED45-14F0-82EC-BA0ECB44742B}"/>
-              </a:ext>
-            </a:extLst>
-          </p:cNvPr>
-          <p:cNvSpPr>
-            <a:spLocks noGrp="1"/>
-          </p:cNvSpPr>
-          <p:nvPr>
-            <p:ph type="title"/>
-          </p:nvPr>
-        </p:nvSpPr>
-        <p:spPr/>
-        <p:txBody>
-          <a:bodyPr/>
-          <a:lstStyle/>
-          <a:p>
-            <a:r>
-              <a:rPr lang="en-US" dirty="0"/>
-              <a:t>User Story #1</a:t>
-            </a:r>
-          </a:p>
-        </p:txBody>
-      </p:sp>
-      <p:sp>
-        <p:nvSpPr>
-          <p:cNvPr id="3" name="Content Placeholder 2">
-            <a:extLst>
-              <a:ext uri="{FF2B5EF4-FFF2-40B4-BE49-F238E27FC236}">
-                <a16:creationId xmlns:a16="http://schemas.microsoft.com/office/drawing/2014/main" id="{5C2B198A-4BD9-8A94-A124-7B3F56D2955C}"/>
-              </a:ext>
-            </a:extLst>
-          </p:cNvPr>
-          <p:cNvSpPr>
-            <a:spLocks noGrp="1"/>
-          </p:cNvSpPr>
-          <p:nvPr>
-            <p:ph idx="1"/>
-          </p:nvPr>
-        </p:nvSpPr>
-        <p:spPr/>
-        <p:txBody>
-          <a:bodyPr/>
-          <a:lstStyle/>
-          <a:p>
-            <a:r>
-              <a:rPr lang="en-US" dirty="0"/>
-              <a:t>As a citizen, I want to be able to report potholes so that the town can do something about them. (E)</a:t>
-            </a:r>
-          </a:p>
-        </p:txBody>
-      </p:sp>
-      <p:sp>
-        <p:nvSpPr>
-          <p:cNvPr id="4" name="Slide Number Placeholder 3">
-            <a:extLst>
-              <a:ext uri="{FF2B5EF4-FFF2-40B4-BE49-F238E27FC236}">
-                <a16:creationId xmlns:a16="http://schemas.microsoft.com/office/drawing/2014/main" id="{723C6E9F-E6BE-1DB1-1A2A-ECBC77E5494A}"/>
-              </a:ext>
-            </a:extLst>
-          </p:cNvPr>
-          <p:cNvSpPr>
-            <a:spLocks noGrp="1"/>
-          </p:cNvSpPr>
-          <p:nvPr>
-            <p:ph type="sldNum" sz="quarter" idx="12"/>
-          </p:nvPr>
-        </p:nvSpPr>
-        <p:spPr/>
-        <p:txBody>
-          <a:bodyPr/>
-          <a:lstStyle/>
-          <a:p>
-            <a:fld id="{20F37917-FD3A-4669-9018-DA04BCDD3D75}" type="slidenum">
-              <a:rPr lang="en-US" smtClean="0"/>
-              <a:t>17</a:t>
-            </a:fld>
-            <a:endParaRPr lang="en-US"/>
-          </a:p>
-        </p:txBody>
-      </p:sp>
-    </p:spTree>
-    <p:extLst>
-      <p:ext uri="{BB962C8B-B14F-4D97-AF65-F5344CB8AC3E}">
-        <p14:creationId xmlns:p14="http://schemas.microsoft.com/office/powerpoint/2010/main" val="2839345455"/>
       </p:ext>
     </p:extLst>
   </p:cSld>
@@ -14706,7 +14905,7 @@
           <p:cNvPr id="2" name="Title 1">
             <a:extLst>
               <a:ext uri="{FF2B5EF4-FFF2-40B4-BE49-F238E27FC236}">
-                <a16:creationId xmlns:a16="http://schemas.microsoft.com/office/drawing/2014/main" id="{B495D98E-5472-E530-DD2E-6E1802BCFCA4}"/>
+                <a16:creationId xmlns:a16="http://schemas.microsoft.com/office/drawing/2014/main" id="{605A4A5A-ED45-14F0-82EC-BA0ECB44742B}"/>
               </a:ext>
             </a:extLst>
           </p:cNvPr>
@@ -14724,7 +14923,7 @@
           <a:p>
             <a:r>
               <a:rPr lang="en-US" dirty="0"/>
-              <a:t>Conditions of Satisfaction</a:t>
+              <a:t>User Story #1</a:t>
             </a:r>
           </a:p>
         </p:txBody>
@@ -14734,7 +14933,7 @@
           <p:cNvPr id="3" name="Content Placeholder 2">
             <a:extLst>
               <a:ext uri="{FF2B5EF4-FFF2-40B4-BE49-F238E27FC236}">
-                <a16:creationId xmlns:a16="http://schemas.microsoft.com/office/drawing/2014/main" id="{86E00573-79BC-FAF6-9C28-90EB8A345C05}"/>
+                <a16:creationId xmlns:a16="http://schemas.microsoft.com/office/drawing/2014/main" id="{5C2B198A-4BD9-8A94-A124-7B3F56D2955C}"/>
               </a:ext>
             </a:extLst>
           </p:cNvPr>
@@ -14745,51 +14944,15 @@
             <p:ph idx="1"/>
           </p:nvPr>
         </p:nvSpPr>
-        <p:spPr>
-          <a:xfrm>
-            <a:off x="838200" y="1500160"/>
-            <a:ext cx="10049540" cy="4351338"/>
-          </a:xfrm>
-        </p:spPr>
+        <p:spPr/>
         <p:txBody>
-          <a:bodyPr>
-            <a:normAutofit/>
-          </a:bodyPr>
+          <a:bodyPr/>
           <a:lstStyle/>
           <a:p>
             <a:r>
               <a:rPr lang="en-US" dirty="0"/>
-              <a:t>1.1 I should be able to report a pothole to the system (E)</a:t>
-            </a:r>
-          </a:p>
-          <a:p>
-            <a:r>
-              <a:rPr lang="en-US" dirty="0"/>
-              <a:t>1.2 I should be able to </a:t>
-            </a:r>
-            <a:r>
-              <a:rPr lang="en-US" dirty="0" err="1"/>
-              <a:t>to</a:t>
-            </a:r>
-            <a:r>
-              <a:rPr lang="en-US" dirty="0"/>
-              <a:t> see whether the pothole I report has been repaired (E)</a:t>
-            </a:r>
-          </a:p>
-          <a:p>
-            <a:r>
-              <a:rPr lang="en-US" dirty="0"/>
-              <a:t>1.3 I should be able to see whether someone else has already reported a given pothole (D)</a:t>
-            </a:r>
-          </a:p>
-          <a:p>
-            <a:r>
-              <a:rPr lang="en-US" dirty="0"/>
-              <a:t>1.4 I should be able to see an estimated time when the pothole should be repaired (D)</a:t>
-            </a:r>
-          </a:p>
-          <a:p>
-            <a:endParaRPr lang="en-US" dirty="0"/>
+              <a:t>As a citizen, I want to be able to report potholes so that the town can do something about them. (E)</a:t>
+            </a:r>
           </a:p>
         </p:txBody>
       </p:sp>
@@ -14798,7 +14961,7 @@
           <p:cNvPr id="4" name="Slide Number Placeholder 3">
             <a:extLst>
               <a:ext uri="{FF2B5EF4-FFF2-40B4-BE49-F238E27FC236}">
-                <a16:creationId xmlns:a16="http://schemas.microsoft.com/office/drawing/2014/main" id="{8F54511B-A92F-CD3A-1825-CA2491CCD033}"/>
+                <a16:creationId xmlns:a16="http://schemas.microsoft.com/office/drawing/2014/main" id="{723C6E9F-E6BE-1DB1-1A2A-ECBC77E5494A}"/>
               </a:ext>
             </a:extLst>
           </p:cNvPr>
@@ -14825,7 +14988,7 @@
     </p:spTree>
     <p:extLst>
       <p:ext uri="{BB962C8B-B14F-4D97-AF65-F5344CB8AC3E}">
-        <p14:creationId xmlns:p14="http://schemas.microsoft.com/office/powerpoint/2010/main" val="1293668376"/>
+        <p14:creationId xmlns:p14="http://schemas.microsoft.com/office/powerpoint/2010/main" val="2839345455"/>
       </p:ext>
     </p:extLst>
   </p:cSld>
@@ -14857,7 +15020,7 @@
           <p:cNvPr id="2" name="Title 1">
             <a:extLst>
               <a:ext uri="{FF2B5EF4-FFF2-40B4-BE49-F238E27FC236}">
-                <a16:creationId xmlns:a16="http://schemas.microsoft.com/office/drawing/2014/main" id="{AF17FECE-982A-68AD-33C0-FADB0ECEAC70}"/>
+                <a16:creationId xmlns:a16="http://schemas.microsoft.com/office/drawing/2014/main" id="{B495D98E-5472-E530-DD2E-6E1802BCFCA4}"/>
               </a:ext>
             </a:extLst>
           </p:cNvPr>
@@ -14875,7 +15038,7 @@
           <a:p>
             <a:r>
               <a:rPr lang="en-US" dirty="0"/>
-              <a:t>User Story #2</a:t>
+              <a:t>Conditions of Satisfaction</a:t>
             </a:r>
           </a:p>
         </p:txBody>
@@ -14885,7 +15048,7 @@
           <p:cNvPr id="3" name="Content Placeholder 2">
             <a:extLst>
               <a:ext uri="{FF2B5EF4-FFF2-40B4-BE49-F238E27FC236}">
-                <a16:creationId xmlns:a16="http://schemas.microsoft.com/office/drawing/2014/main" id="{92F5E93F-826B-173F-2672-D74656C0CE5D}"/>
+                <a16:creationId xmlns:a16="http://schemas.microsoft.com/office/drawing/2014/main" id="{86E00573-79BC-FAF6-9C28-90EB8A345C05}"/>
               </a:ext>
             </a:extLst>
           </p:cNvPr>
@@ -14896,15 +15059,51 @@
             <p:ph idx="1"/>
           </p:nvPr>
         </p:nvSpPr>
-        <p:spPr/>
+        <p:spPr>
+          <a:xfrm>
+            <a:off x="838200" y="1500160"/>
+            <a:ext cx="10049540" cy="4351338"/>
+          </a:xfrm>
+        </p:spPr>
         <p:txBody>
-          <a:bodyPr/>
+          <a:bodyPr>
+            <a:normAutofit/>
+          </a:bodyPr>
           <a:lstStyle/>
           <a:p>
             <a:r>
               <a:rPr lang="en-US" dirty="0"/>
-              <a:t>As a repair-truck driver, I want the system to display the potholes I should be working on today. (E)</a:t>
-            </a:r>
+              <a:t>1.1 I should be able to report a pothole to the system (E)</a:t>
+            </a:r>
+          </a:p>
+          <a:p>
+            <a:r>
+              <a:rPr lang="en-US" dirty="0"/>
+              <a:t>1.2 I should be able to </a:t>
+            </a:r>
+            <a:r>
+              <a:rPr lang="en-US" dirty="0" err="1"/>
+              <a:t>to</a:t>
+            </a:r>
+            <a:r>
+              <a:rPr lang="en-US" dirty="0"/>
+              <a:t> see whether the pothole I report has been repaired (E)</a:t>
+            </a:r>
+          </a:p>
+          <a:p>
+            <a:r>
+              <a:rPr lang="en-US" dirty="0"/>
+              <a:t>1.3 I should be able to see whether someone else has already reported a given pothole (D)</a:t>
+            </a:r>
+          </a:p>
+          <a:p>
+            <a:r>
+              <a:rPr lang="en-US" dirty="0"/>
+              <a:t>1.4 I should be able to see an estimated time when the pothole should be repaired (D)</a:t>
+            </a:r>
+          </a:p>
+          <a:p>
+            <a:endParaRPr lang="en-US" dirty="0"/>
           </a:p>
         </p:txBody>
       </p:sp>
@@ -14913,7 +15112,7 @@
           <p:cNvPr id="4" name="Slide Number Placeholder 3">
             <a:extLst>
               <a:ext uri="{FF2B5EF4-FFF2-40B4-BE49-F238E27FC236}">
-                <a16:creationId xmlns:a16="http://schemas.microsoft.com/office/drawing/2014/main" id="{70076510-69D4-AC98-4890-8F145337C072}"/>
+                <a16:creationId xmlns:a16="http://schemas.microsoft.com/office/drawing/2014/main" id="{8F54511B-A92F-CD3A-1825-CA2491CCD033}"/>
               </a:ext>
             </a:extLst>
           </p:cNvPr>
@@ -14940,7 +15139,7 @@
     </p:spTree>
     <p:extLst>
       <p:ext uri="{BB962C8B-B14F-4D97-AF65-F5344CB8AC3E}">
-        <p14:creationId xmlns:p14="http://schemas.microsoft.com/office/powerpoint/2010/main" val="211824431"/>
+        <p14:creationId xmlns:p14="http://schemas.microsoft.com/office/powerpoint/2010/main" val="1293668376"/>
       </p:ext>
     </p:extLst>
   </p:cSld>
@@ -15120,7 +15319,7 @@
           <p:cNvPr id="2" name="Title 1">
             <a:extLst>
               <a:ext uri="{FF2B5EF4-FFF2-40B4-BE49-F238E27FC236}">
-                <a16:creationId xmlns:a16="http://schemas.microsoft.com/office/drawing/2014/main" id="{DB4EF509-325C-2E10-8B51-0A2D68AEAA9A}"/>
+                <a16:creationId xmlns:a16="http://schemas.microsoft.com/office/drawing/2014/main" id="{AF17FECE-982A-68AD-33C0-FADB0ECEAC70}"/>
               </a:ext>
             </a:extLst>
           </p:cNvPr>
@@ -15138,7 +15337,7 @@
           <a:p>
             <a:r>
               <a:rPr lang="en-US" dirty="0"/>
-              <a:t>Conditions of Satisfaction</a:t>
+              <a:t>User Story #2</a:t>
             </a:r>
           </a:p>
         </p:txBody>
@@ -15148,7 +15347,7 @@
           <p:cNvPr id="3" name="Content Placeholder 2">
             <a:extLst>
               <a:ext uri="{FF2B5EF4-FFF2-40B4-BE49-F238E27FC236}">
-                <a16:creationId xmlns:a16="http://schemas.microsoft.com/office/drawing/2014/main" id="{CBB1E84F-2F63-BC6C-A225-EF6FC6AF5970}"/>
+                <a16:creationId xmlns:a16="http://schemas.microsoft.com/office/drawing/2014/main" id="{92F5E93F-826B-173F-2672-D74656C0CE5D}"/>
               </a:ext>
             </a:extLst>
           </p:cNvPr>
@@ -15159,43 +15358,15 @@
             <p:ph idx="1"/>
           </p:nvPr>
         </p:nvSpPr>
-        <p:spPr>
-          <a:xfrm>
-            <a:off x="838199" y="1500160"/>
-            <a:ext cx="9815623" cy="4351338"/>
-          </a:xfrm>
-        </p:spPr>
+        <p:spPr/>
         <p:txBody>
-          <a:bodyPr>
-            <a:normAutofit/>
-          </a:bodyPr>
+          <a:bodyPr/>
           <a:lstStyle/>
           <a:p>
             <a:r>
               <a:rPr lang="en-US" dirty="0"/>
-              <a:t>2.1 I should be able to see my list of potholes for today (E)</a:t>
-            </a:r>
-          </a:p>
-          <a:p>
-            <a:r>
-              <a:rPr lang="en-US" dirty="0"/>
-              <a:t>2.2 I should be able to report that I repaired a given pothole (E)</a:t>
-            </a:r>
-          </a:p>
-          <a:p>
-            <a:r>
-              <a:rPr lang="en-US" dirty="0"/>
-              <a:t>2.3 I should be able to report that I was unable to repair a given pothole, and to supply a reason (E)</a:t>
-            </a:r>
-          </a:p>
-          <a:p>
-            <a:r>
-              <a:rPr lang="en-US" dirty="0"/>
-              <a:t>2.4 My daily list of potholes should be listed in an order that cuts down the time I spend driving from job to job (D)</a:t>
-            </a:r>
-          </a:p>
-          <a:p>
-            <a:endParaRPr lang="en-US" dirty="0"/>
+              <a:t>As a repair-truck driver, I want the system to display the potholes I should be working on today. (E)</a:t>
+            </a:r>
           </a:p>
         </p:txBody>
       </p:sp>
@@ -15204,7 +15375,7 @@
           <p:cNvPr id="4" name="Slide Number Placeholder 3">
             <a:extLst>
               <a:ext uri="{FF2B5EF4-FFF2-40B4-BE49-F238E27FC236}">
-                <a16:creationId xmlns:a16="http://schemas.microsoft.com/office/drawing/2014/main" id="{42E1B159-DFF9-5C1E-761D-6E4AC20749E7}"/>
+                <a16:creationId xmlns:a16="http://schemas.microsoft.com/office/drawing/2014/main" id="{70076510-69D4-AC98-4890-8F145337C072}"/>
               </a:ext>
             </a:extLst>
           </p:cNvPr>
@@ -15231,7 +15402,7 @@
     </p:spTree>
     <p:extLst>
       <p:ext uri="{BB962C8B-B14F-4D97-AF65-F5344CB8AC3E}">
-        <p14:creationId xmlns:p14="http://schemas.microsoft.com/office/powerpoint/2010/main" val="2216743730"/>
+        <p14:creationId xmlns:p14="http://schemas.microsoft.com/office/powerpoint/2010/main" val="211824431"/>
       </p:ext>
     </p:extLst>
   </p:cSld>
@@ -15263,7 +15434,7 @@
           <p:cNvPr id="2" name="Title 1">
             <a:extLst>
               <a:ext uri="{FF2B5EF4-FFF2-40B4-BE49-F238E27FC236}">
-                <a16:creationId xmlns:a16="http://schemas.microsoft.com/office/drawing/2014/main" id="{51B35226-A378-2076-F502-857ABB7AF3AE}"/>
+                <a16:creationId xmlns:a16="http://schemas.microsoft.com/office/drawing/2014/main" id="{DB4EF509-325C-2E10-8B51-0A2D68AEAA9A}"/>
               </a:ext>
             </a:extLst>
           </p:cNvPr>
@@ -15281,7 +15452,7 @@
           <a:p>
             <a:r>
               <a:rPr lang="en-US" dirty="0"/>
-              <a:t>User Story #3</a:t>
+              <a:t>Conditions of Satisfaction</a:t>
             </a:r>
           </a:p>
         </p:txBody>
@@ -15291,7 +15462,7 @@
           <p:cNvPr id="3" name="Content Placeholder 2">
             <a:extLst>
               <a:ext uri="{FF2B5EF4-FFF2-40B4-BE49-F238E27FC236}">
-                <a16:creationId xmlns:a16="http://schemas.microsoft.com/office/drawing/2014/main" id="{276D5AE4-968D-3E05-4E3E-4D06828F5C68}"/>
+                <a16:creationId xmlns:a16="http://schemas.microsoft.com/office/drawing/2014/main" id="{CBB1E84F-2F63-BC6C-A225-EF6FC6AF5970}"/>
               </a:ext>
             </a:extLst>
           </p:cNvPr>
@@ -15302,18 +15473,40 @@
             <p:ph idx="1"/>
           </p:nvPr>
         </p:nvSpPr>
-        <p:spPr/>
+        <p:spPr>
+          <a:xfrm>
+            <a:off x="838199" y="1500160"/>
+            <a:ext cx="9815623" cy="4351338"/>
+          </a:xfrm>
+        </p:spPr>
         <p:txBody>
-          <a:bodyPr/>
+          <a:bodyPr>
+            <a:normAutofit/>
+          </a:bodyPr>
           <a:lstStyle/>
           <a:p>
             <a:r>
               <a:rPr lang="en-US" dirty="0"/>
-              <a:t>As a maintenance supervisor, I want to be able to control the order in which potholes are repaired (D?)</a:t>
-            </a:r>
-          </a:p>
-          <a:p>
-            <a:endParaRPr lang="en-US" dirty="0"/>
+              <a:t>2.1 I should be able to see my list of potholes for today (E)</a:t>
+            </a:r>
+          </a:p>
+          <a:p>
+            <a:r>
+              <a:rPr lang="en-US" dirty="0"/>
+              <a:t>2.2 I should be able to report that I repaired a given pothole (E)</a:t>
+            </a:r>
+          </a:p>
+          <a:p>
+            <a:r>
+              <a:rPr lang="en-US" dirty="0"/>
+              <a:t>2.3 I should be able to report that I was unable to repair a given pothole, and to supply a reason (E)</a:t>
+            </a:r>
+          </a:p>
+          <a:p>
+            <a:r>
+              <a:rPr lang="en-US" dirty="0"/>
+              <a:t>2.4 My daily list of potholes should be listed in an order that cuts down the time I spend driving from job to job (D)</a:t>
+            </a:r>
           </a:p>
           <a:p>
             <a:endParaRPr lang="en-US" dirty="0"/>
@@ -15325,7 +15518,7 @@
           <p:cNvPr id="4" name="Slide Number Placeholder 3">
             <a:extLst>
               <a:ext uri="{FF2B5EF4-FFF2-40B4-BE49-F238E27FC236}">
-                <a16:creationId xmlns:a16="http://schemas.microsoft.com/office/drawing/2014/main" id="{2B519DCE-6F48-BA3E-A368-668137E1BB7F}"/>
+                <a16:creationId xmlns:a16="http://schemas.microsoft.com/office/drawing/2014/main" id="{42E1B159-DFF9-5C1E-761D-6E4AC20749E7}"/>
               </a:ext>
             </a:extLst>
           </p:cNvPr>
@@ -15352,7 +15545,7 @@
     </p:spTree>
     <p:extLst>
       <p:ext uri="{BB962C8B-B14F-4D97-AF65-F5344CB8AC3E}">
-        <p14:creationId xmlns:p14="http://schemas.microsoft.com/office/powerpoint/2010/main" val="3609669479"/>
+        <p14:creationId xmlns:p14="http://schemas.microsoft.com/office/powerpoint/2010/main" val="2216743730"/>
       </p:ext>
     </p:extLst>
   </p:cSld>
@@ -15384,6 +15577,127 @@
           <p:cNvPr id="2" name="Title 1">
             <a:extLst>
               <a:ext uri="{FF2B5EF4-FFF2-40B4-BE49-F238E27FC236}">
+                <a16:creationId xmlns:a16="http://schemas.microsoft.com/office/drawing/2014/main" id="{51B35226-A378-2076-F502-857ABB7AF3AE}"/>
+              </a:ext>
+            </a:extLst>
+          </p:cNvPr>
+          <p:cNvSpPr>
+            <a:spLocks noGrp="1"/>
+          </p:cNvSpPr>
+          <p:nvPr>
+            <p:ph type="title"/>
+          </p:nvPr>
+        </p:nvSpPr>
+        <p:spPr/>
+        <p:txBody>
+          <a:bodyPr/>
+          <a:lstStyle/>
+          <a:p>
+            <a:r>
+              <a:rPr lang="en-US" dirty="0"/>
+              <a:t>User Story #3</a:t>
+            </a:r>
+          </a:p>
+        </p:txBody>
+      </p:sp>
+      <p:sp>
+        <p:nvSpPr>
+          <p:cNvPr id="3" name="Content Placeholder 2">
+            <a:extLst>
+              <a:ext uri="{FF2B5EF4-FFF2-40B4-BE49-F238E27FC236}">
+                <a16:creationId xmlns:a16="http://schemas.microsoft.com/office/drawing/2014/main" id="{276D5AE4-968D-3E05-4E3E-4D06828F5C68}"/>
+              </a:ext>
+            </a:extLst>
+          </p:cNvPr>
+          <p:cNvSpPr>
+            <a:spLocks noGrp="1"/>
+          </p:cNvSpPr>
+          <p:nvPr>
+            <p:ph idx="1"/>
+          </p:nvPr>
+        </p:nvSpPr>
+        <p:spPr/>
+        <p:txBody>
+          <a:bodyPr/>
+          <a:lstStyle/>
+          <a:p>
+            <a:r>
+              <a:rPr lang="en-US" dirty="0"/>
+              <a:t>As a maintenance supervisor, I want to be able to control the order in which potholes are repaired (D?)</a:t>
+            </a:r>
+          </a:p>
+          <a:p>
+            <a:endParaRPr lang="en-US" dirty="0"/>
+          </a:p>
+          <a:p>
+            <a:endParaRPr lang="en-US" dirty="0"/>
+          </a:p>
+        </p:txBody>
+      </p:sp>
+      <p:sp>
+        <p:nvSpPr>
+          <p:cNvPr id="4" name="Slide Number Placeholder 3">
+            <a:extLst>
+              <a:ext uri="{FF2B5EF4-FFF2-40B4-BE49-F238E27FC236}">
+                <a16:creationId xmlns:a16="http://schemas.microsoft.com/office/drawing/2014/main" id="{2B519DCE-6F48-BA3E-A368-668137E1BB7F}"/>
+              </a:ext>
+            </a:extLst>
+          </p:cNvPr>
+          <p:cNvSpPr>
+            <a:spLocks noGrp="1"/>
+          </p:cNvSpPr>
+          <p:nvPr>
+            <p:ph type="sldNum" sz="quarter" idx="12"/>
+          </p:nvPr>
+        </p:nvSpPr>
+        <p:spPr/>
+        <p:txBody>
+          <a:bodyPr/>
+          <a:lstStyle/>
+          <a:p>
+            <a:fld id="{20F37917-FD3A-4669-9018-DA04BCDD3D75}" type="slidenum">
+              <a:rPr lang="en-US" smtClean="0"/>
+              <a:t>22</a:t>
+            </a:fld>
+            <a:endParaRPr lang="en-US"/>
+          </a:p>
+        </p:txBody>
+      </p:sp>
+    </p:spTree>
+    <p:extLst>
+      <p:ext uri="{BB962C8B-B14F-4D97-AF65-F5344CB8AC3E}">
+        <p14:creationId xmlns:p14="http://schemas.microsoft.com/office/powerpoint/2010/main" val="3609669479"/>
+      </p:ext>
+    </p:extLst>
+  </p:cSld>
+  <p:clrMapOvr>
+    <a:masterClrMapping/>
+  </p:clrMapOvr>
+</p:sld>
+</file>
+
+<file path=ppt/slides/slide23.xml><?xml version="1.0" encoding="utf-8"?>
+<p:sld xmlns:a="http://schemas.openxmlformats.org/drawingml/2006/main" xmlns:r="http://schemas.openxmlformats.org/officeDocument/2006/relationships" xmlns:p="http://schemas.openxmlformats.org/presentationml/2006/main">
+  <p:cSld>
+    <p:spTree>
+      <p:nvGrpSpPr>
+        <p:cNvPr id="1" name=""/>
+        <p:cNvGrpSpPr/>
+        <p:nvPr/>
+      </p:nvGrpSpPr>
+      <p:grpSpPr>
+        <a:xfrm>
+          <a:off x="0" y="0"/>
+          <a:ext cx="0" cy="0"/>
+          <a:chOff x="0" y="0"/>
+          <a:chExt cx="0" cy="0"/>
+        </a:xfrm>
+      </p:grpSpPr>
+      <p:sp>
+        <p:nvSpPr>
+          <p:cNvPr id="2" name="Title 1">
+            <a:extLst>
+              <a:ext uri="{FF2B5EF4-FFF2-40B4-BE49-F238E27FC236}">
                 <a16:creationId xmlns:a16="http://schemas.microsoft.com/office/drawing/2014/main" id="{988E1553-21A9-4B1E-36A1-6A886676B256}"/>
               </a:ext>
             </a:extLst>
@@ -15483,7 +15797,7 @@
           <a:p>
             <a:fld id="{20F37917-FD3A-4669-9018-DA04BCDD3D75}" type="slidenum">
               <a:rPr lang="en-US" smtClean="0"/>
-              <a:t>22</a:t>
+              <a:t>23</a:t>
             </a:fld>
             <a:endParaRPr lang="en-US"/>
           </a:p>
@@ -15502,7 +15816,7 @@
 </p:sld>
 </file>
 
-<file path=ppt/slides/slide23.xml><?xml version="1.0" encoding="utf-8"?>
+<file path=ppt/slides/slide24.xml><?xml version="1.0" encoding="utf-8"?>
 <p:sld xmlns:a="http://schemas.openxmlformats.org/drawingml/2006/main" xmlns:r="http://schemas.openxmlformats.org/officeDocument/2006/relationships" xmlns:p="http://schemas.openxmlformats.org/presentationml/2006/main">
   <p:cSld>
     <p:bg>
@@ -16184,7 +16498,7 @@
                   <a:spcPts val="600"/>
                 </a:spcAft>
               </a:pPr>
-              <a:t>23</a:t>
+              <a:t>24</a:t>
             </a:fld>
             <a:endParaRPr lang="en-US"/>
           </a:p>
@@ -16203,7 +16517,7 @@
 </p:sld>
 </file>
 
-<file path=ppt/slides/slide24.xml><?xml version="1.0" encoding="utf-8"?>
+<file path=ppt/slides/slide25.xml><?xml version="1.0" encoding="utf-8"?>
 <p:sld xmlns:a="http://schemas.openxmlformats.org/drawingml/2006/main" xmlns:r="http://schemas.openxmlformats.org/officeDocument/2006/relationships" xmlns:p="http://schemas.openxmlformats.org/presentationml/2006/main">
   <p:cSld>
     <p:bg>
@@ -16835,7 +17149,7 @@
                   <a:spcPts val="600"/>
                 </a:spcAft>
               </a:pPr>
-              <a:t>24</a:t>
+              <a:t>25</a:t>
             </a:fld>
             <a:endParaRPr lang="en-US">
               <a:solidFill>
@@ -16849,222 +17163,6 @@
     <p:extLst>
       <p:ext uri="{BB962C8B-B14F-4D97-AF65-F5344CB8AC3E}">
         <p14:creationId xmlns:p14="http://schemas.microsoft.com/office/powerpoint/2010/main" val="3108382758"/>
-      </p:ext>
-    </p:extLst>
-  </p:cSld>
-  <p:clrMapOvr>
-    <a:masterClrMapping/>
-  </p:clrMapOvr>
-</p:sld>
-</file>
-
-<file path=ppt/slides/slide25.xml><?xml version="1.0" encoding="utf-8"?>
-<p:sld xmlns:a="http://schemas.openxmlformats.org/drawingml/2006/main" xmlns:r="http://schemas.openxmlformats.org/officeDocument/2006/relationships" xmlns:p="http://schemas.openxmlformats.org/presentationml/2006/main">
-  <p:cSld>
-    <p:spTree>
-      <p:nvGrpSpPr>
-        <p:cNvPr id="1" name=""/>
-        <p:cNvGrpSpPr/>
-        <p:nvPr/>
-      </p:nvGrpSpPr>
-      <p:grpSpPr>
-        <a:xfrm>
-          <a:off x="0" y="0"/>
-          <a:ext cx="0" cy="0"/>
-          <a:chOff x="0" y="0"/>
-          <a:chExt cx="0" cy="0"/>
-        </a:xfrm>
-      </p:grpSpPr>
-      <p:sp>
-        <p:nvSpPr>
-          <p:cNvPr id="3" name="Content Placeholder 2">
-            <a:extLst>
-              <a:ext uri="{FF2B5EF4-FFF2-40B4-BE49-F238E27FC236}">
-                <a16:creationId xmlns:a16="http://schemas.microsoft.com/office/drawing/2014/main" id="{3C270DA0-CEDD-7D08-8774-EAEB8515E419}"/>
-              </a:ext>
-            </a:extLst>
-          </p:cNvPr>
-          <p:cNvSpPr>
-            <a:spLocks noGrp="1"/>
-          </p:cNvSpPr>
-          <p:nvPr>
-            <p:ph idx="1"/>
-          </p:nvPr>
-        </p:nvSpPr>
-        <p:spPr/>
-        <p:txBody>
-          <a:bodyPr>
-            <a:normAutofit/>
-          </a:bodyPr>
-          <a:lstStyle/>
-          <a:p>
-            <a:pPr marL="0" indent="0">
-              <a:buNone/>
-            </a:pPr>
-            <a:r>
-              <a:rPr lang="en-US" dirty="0"/>
-              <a:t>The database should allow me to:</a:t>
-            </a:r>
-          </a:p>
-          <a:p>
-            <a:pPr marL="914400" lvl="1" indent="-457200">
-              <a:buFont typeface="+mj-lt"/>
-              <a:buAutoNum type="arabicPeriod"/>
-            </a:pPr>
-            <a:r>
-              <a:rPr lang="en-US" sz="2800" dirty="0">
-                <a:solidFill>
-                  <a:schemeClr val="tx1"/>
-                </a:solidFill>
-              </a:rPr>
-              <a:t>Add a new student to the database</a:t>
-            </a:r>
-          </a:p>
-          <a:p>
-            <a:pPr marL="971550" lvl="1" indent="-514350">
-              <a:buFont typeface="+mj-lt"/>
-              <a:buAutoNum type="arabicPeriod"/>
-            </a:pPr>
-            <a:r>
-              <a:rPr lang="en-US" sz="2800" dirty="0">
-                <a:solidFill>
-                  <a:schemeClr val="tx1"/>
-                </a:solidFill>
-              </a:rPr>
-              <a:t>Add a new student with the same name as an existing student.</a:t>
-            </a:r>
-          </a:p>
-          <a:p>
-            <a:pPr marL="971550" lvl="1" indent="-514350">
-              <a:buFont typeface="+mj-lt"/>
-              <a:buAutoNum type="arabicPeriod"/>
-            </a:pPr>
-            <a:r>
-              <a:rPr lang="en-US" sz="2800" dirty="0">
-                <a:solidFill>
-                  <a:schemeClr val="tx1"/>
-                </a:solidFill>
-              </a:rPr>
-              <a:t>Retrieve the transcript for a student</a:t>
-            </a:r>
-          </a:p>
-          <a:p>
-            <a:pPr marL="971550" lvl="1" indent="-514350">
-              <a:buFont typeface="+mj-lt"/>
-              <a:buAutoNum type="arabicPeriod"/>
-            </a:pPr>
-            <a:r>
-              <a:rPr lang="en-US" sz="2800" dirty="0">
-                <a:solidFill>
-                  <a:schemeClr val="tx1"/>
-                </a:solidFill>
-              </a:rPr>
-              <a:t>Delete a student from the database</a:t>
-            </a:r>
-          </a:p>
-          <a:p>
-            <a:pPr marL="971550" lvl="1" indent="-514350">
-              <a:buFont typeface="+mj-lt"/>
-              <a:buAutoNum type="arabicPeriod"/>
-            </a:pPr>
-            <a:r>
-              <a:rPr lang="en-US" sz="2800" dirty="0">
-                <a:solidFill>
-                  <a:schemeClr val="tx1"/>
-                </a:solidFill>
-              </a:rPr>
-              <a:t>Add a new grade for an existing student</a:t>
-            </a:r>
-          </a:p>
-          <a:p>
-            <a:pPr marL="971550" lvl="1" indent="-514350">
-              <a:buFont typeface="+mj-lt"/>
-              <a:buAutoNum type="arabicPeriod"/>
-            </a:pPr>
-            <a:r>
-              <a:rPr lang="en-US" sz="2800" dirty="0">
-                <a:solidFill>
-                  <a:schemeClr val="tx1"/>
-                </a:solidFill>
-              </a:rPr>
-              <a:t>Find out the grade that a student got in a course that they took</a:t>
-            </a:r>
-          </a:p>
-          <a:p>
-            <a:pPr marL="514350" indent="-514350">
-              <a:buFont typeface="+mj-lt"/>
-              <a:buAutoNum type="arabicPeriod"/>
-            </a:pPr>
-            <a:endParaRPr lang="en-US" dirty="0"/>
-          </a:p>
-        </p:txBody>
-      </p:sp>
-      <p:sp>
-        <p:nvSpPr>
-          <p:cNvPr id="4" name="Slide Number Placeholder 3">
-            <a:extLst>
-              <a:ext uri="{FF2B5EF4-FFF2-40B4-BE49-F238E27FC236}">
-                <a16:creationId xmlns:a16="http://schemas.microsoft.com/office/drawing/2014/main" id="{78E266D1-9118-64E3-6ECA-ABE996CBECE0}"/>
-              </a:ext>
-            </a:extLst>
-          </p:cNvPr>
-          <p:cNvSpPr>
-            <a:spLocks noGrp="1"/>
-          </p:cNvSpPr>
-          <p:nvPr>
-            <p:ph type="sldNum" sz="quarter" idx="12"/>
-          </p:nvPr>
-        </p:nvSpPr>
-        <p:spPr/>
-        <p:txBody>
-          <a:bodyPr/>
-          <a:lstStyle/>
-          <a:p>
-            <a:fld id="{20F37917-FD3A-4669-9018-DA04BCDD3D75}" type="slidenum">
-              <a:rPr lang="en-US" smtClean="0"/>
-              <a:t>25</a:t>
-            </a:fld>
-            <a:endParaRPr lang="en-US"/>
-          </a:p>
-        </p:txBody>
-      </p:sp>
-      <p:sp>
-        <p:nvSpPr>
-          <p:cNvPr id="10" name="Title 1">
-            <a:extLst>
-              <a:ext uri="{FF2B5EF4-FFF2-40B4-BE49-F238E27FC236}">
-                <a16:creationId xmlns:a16="http://schemas.microsoft.com/office/drawing/2014/main" id="{40A76719-B99C-FED3-AB8B-6CD70C81E060}"/>
-              </a:ext>
-            </a:extLst>
-          </p:cNvPr>
-          <p:cNvSpPr>
-            <a:spLocks noGrp="1"/>
-          </p:cNvSpPr>
-          <p:nvPr>
-            <p:ph type="title"/>
-          </p:nvPr>
-        </p:nvSpPr>
-        <p:spPr>
-          <a:xfrm>
-            <a:off x="838200" y="17463"/>
-            <a:ext cx="10515600" cy="1325562"/>
-          </a:xfrm>
-        </p:spPr>
-        <p:txBody>
-          <a:bodyPr/>
-          <a:lstStyle/>
-          <a:p>
-            <a:r>
-              <a:rPr lang="en-US" dirty="0"/>
-              <a:t>Satisfaction Conditions</a:t>
-            </a:r>
-          </a:p>
-        </p:txBody>
-      </p:sp>
-    </p:spTree>
-    <p:extLst>
-      <p:ext uri="{BB962C8B-B14F-4D97-AF65-F5344CB8AC3E}">
-        <p14:creationId xmlns:p14="http://schemas.microsoft.com/office/powerpoint/2010/main" val="3767598054"/>
       </p:ext>
     </p:extLst>
   </p:cSld>
@@ -17093,10 +17191,10 @@
       </p:grpSpPr>
       <p:sp>
         <p:nvSpPr>
-          <p:cNvPr id="2" name="Title 1">
+          <p:cNvPr id="3" name="Content Placeholder 2">
             <a:extLst>
               <a:ext uri="{FF2B5EF4-FFF2-40B4-BE49-F238E27FC236}">
-                <a16:creationId xmlns:a16="http://schemas.microsoft.com/office/drawing/2014/main" id="{16F86D58-152F-496B-BA81-FDA5B100832A}"/>
+                <a16:creationId xmlns:a16="http://schemas.microsoft.com/office/drawing/2014/main" id="{3C270DA0-CEDD-7D08-8774-EAEB8515E419}"/>
               </a:ext>
             </a:extLst>
           </p:cNvPr>
@@ -17104,18 +17202,114 @@
             <a:spLocks noGrp="1"/>
           </p:cNvSpPr>
           <p:nvPr>
-            <p:ph type="title"/>
+            <p:ph idx="1"/>
           </p:nvPr>
         </p:nvSpPr>
         <p:spPr/>
         <p:txBody>
-          <a:bodyPr/>
+          <a:bodyPr>
+            <a:normAutofit/>
+          </a:bodyPr>
           <a:lstStyle/>
           <a:p>
+            <a:pPr marL="0" indent="0">
+              <a:buNone/>
+            </a:pPr>
             <a:r>
               <a:rPr lang="en-US" dirty="0"/>
-              <a:t>Non-Functional Requirements:</a:t>
-            </a:r>
+              <a:t>The database should allow me to:</a:t>
+            </a:r>
+          </a:p>
+          <a:p>
+            <a:pPr marL="971550" lvl="1" indent="-514350">
+              <a:buFont typeface="+mj-lt"/>
+              <a:buAutoNum type="arabicPeriod"/>
+            </a:pPr>
+            <a:r>
+              <a:rPr lang="en-US" sz="2800" dirty="0">
+                <a:solidFill>
+                  <a:schemeClr val="tx1"/>
+                </a:solidFill>
+              </a:rPr>
+              <a:t>Add a new student to the database</a:t>
+            </a:r>
+          </a:p>
+          <a:p>
+            <a:pPr marL="971550" lvl="1" indent="-514350">
+              <a:buFont typeface="+mj-lt"/>
+              <a:buAutoNum type="arabicPeriod"/>
+            </a:pPr>
+            <a:r>
+              <a:rPr lang="en-US" sz="2800" dirty="0">
+                <a:solidFill>
+                  <a:schemeClr val="tx1"/>
+                </a:solidFill>
+              </a:rPr>
+              <a:t>Add a new student with the same name as an existing student.</a:t>
+            </a:r>
+          </a:p>
+          <a:p>
+            <a:pPr marL="971550" lvl="1" indent="-514350">
+              <a:buFont typeface="+mj-lt"/>
+              <a:buAutoNum type="arabicPeriod"/>
+            </a:pPr>
+            <a:r>
+              <a:rPr lang="en-US" sz="2800" dirty="0">
+                <a:solidFill>
+                  <a:schemeClr val="tx1"/>
+                </a:solidFill>
+              </a:rPr>
+              <a:t>Retrieve the transcript for a student</a:t>
+            </a:r>
+          </a:p>
+          <a:p>
+            <a:pPr marL="971550" lvl="1" indent="-514350">
+              <a:buFont typeface="+mj-lt"/>
+              <a:buAutoNum type="arabicPeriod"/>
+            </a:pPr>
+            <a:r>
+              <a:rPr lang="en-US" sz="2800" dirty="0">
+                <a:solidFill>
+                  <a:schemeClr val="tx1"/>
+                </a:solidFill>
+              </a:rPr>
+              <a:t>Delete a student from the database</a:t>
+            </a:r>
+          </a:p>
+          <a:p>
+            <a:pPr marL="971550" lvl="1" indent="-514350">
+              <a:buFont typeface="+mj-lt"/>
+              <a:buAutoNum type="arabicPeriod"/>
+            </a:pPr>
+            <a:r>
+              <a:rPr lang="en-US" sz="2800" dirty="0">
+                <a:solidFill>
+                  <a:schemeClr val="tx1"/>
+                </a:solidFill>
+              </a:rPr>
+              <a:t>Add a new grade for an existing student</a:t>
+            </a:r>
+          </a:p>
+          <a:p>
+            <a:pPr marL="971550" lvl="1" indent="-514350">
+              <a:buFont typeface="+mj-lt"/>
+              <a:buAutoNum type="arabicPeriod"/>
+            </a:pPr>
+            <a:r>
+              <a:rPr lang="en-US" sz="2800" dirty="0">
+                <a:solidFill>
+                  <a:schemeClr val="tx1"/>
+                </a:solidFill>
+              </a:rPr>
+              <a:t>Find out the grade that a student got in a course that they took</a:t>
+            </a:r>
+          </a:p>
+          <a:p>
+            <a:pPr marL="514350" indent="-514350">
+              <a:buFont typeface="+mj-lt"/>
+              <a:buAutoNum type="arabicPeriod"/>
+            </a:pPr>
+            <a:endParaRPr lang="en-US" dirty="0"/>
           </a:p>
         </p:txBody>
       </p:sp>
@@ -17124,7 +17318,7 @@
           <p:cNvPr id="4" name="Slide Number Placeholder 3">
             <a:extLst>
               <a:ext uri="{FF2B5EF4-FFF2-40B4-BE49-F238E27FC236}">
-                <a16:creationId xmlns:a16="http://schemas.microsoft.com/office/drawing/2014/main" id="{C7C3DEB3-F948-4B7E-8BDA-FB7ABCF7A993}"/>
+                <a16:creationId xmlns:a16="http://schemas.microsoft.com/office/drawing/2014/main" id="{78E266D1-9118-64E3-6ECA-ABE996CBECE0}"/>
               </a:ext>
             </a:extLst>
           </p:cNvPr>
@@ -17150,10 +17344,10 @@
       </p:sp>
       <p:sp>
         <p:nvSpPr>
-          <p:cNvPr id="9" name="Content Placeholder 2">
+          <p:cNvPr id="10" name="Title 1">
             <a:extLst>
               <a:ext uri="{FF2B5EF4-FFF2-40B4-BE49-F238E27FC236}">
-                <a16:creationId xmlns:a16="http://schemas.microsoft.com/office/drawing/2014/main" id="{154B344C-9133-E9C8-0056-74943F854D75}"/>
+                <a16:creationId xmlns:a16="http://schemas.microsoft.com/office/drawing/2014/main" id="{40A76719-B99C-FED3-AB8B-6CD70C81E060}"/>
               </a:ext>
             </a:extLst>
           </p:cNvPr>
@@ -17161,13 +17355,13 @@
             <a:spLocks noGrp="1"/>
           </p:cNvSpPr>
           <p:nvPr>
-            <p:ph idx="1"/>
+            <p:ph type="title"/>
           </p:nvPr>
         </p:nvSpPr>
         <p:spPr>
           <a:xfrm>
-            <a:off x="838200" y="1500188"/>
-            <a:ext cx="9521142" cy="4351337"/>
+            <a:off x="838200" y="17463"/>
+            <a:ext cx="10515600" cy="1325562"/>
           </a:xfrm>
         </p:spPr>
         <p:txBody>
@@ -17176,42 +17370,7 @@
           <a:p>
             <a:r>
               <a:rPr lang="en-US" dirty="0"/>
-              <a:t>What other properties might a customer want to know about the product?</a:t>
-            </a:r>
-          </a:p>
-          <a:p>
-            <a:pPr lvl="1"/>
-            <a:r>
-              <a:rPr lang="en-US" dirty="0"/>
-              <a:t>How quickly can a transcript be retrieval? (Performance)</a:t>
-            </a:r>
-          </a:p>
-          <a:p>
-            <a:pPr lvl="1"/>
-            <a:r>
-              <a:rPr lang="en-US" dirty="0"/>
-              <a:t>How many student transcripts can our system store? (Scalability)</a:t>
-            </a:r>
-          </a:p>
-          <a:p>
-            <a:pPr lvl="1"/>
-            <a:r>
-              <a:rPr lang="en-US" dirty="0"/>
-              <a:t>How long did I spend on the phone with support to set up the software? (Usability)</a:t>
-            </a:r>
-          </a:p>
-          <a:p>
-            <a:pPr lvl="1"/>
-            <a:r>
-              <a:rPr lang="en-US" dirty="0"/>
-              <a:t>After my system is setup, is the access controlled at all? (Security)</a:t>
-            </a:r>
-          </a:p>
-          <a:p>
-            <a:pPr lvl="1"/>
-            <a:r>
-              <a:rPr lang="en-US" dirty="0"/>
-              <a:t>Are these any times when I can’t use this system? (Availability) </a:t>
+              <a:t>Satisfaction Conditions</a:t>
             </a:r>
           </a:p>
         </p:txBody>
@@ -17219,7 +17378,7 @@
     </p:spTree>
     <p:extLst>
       <p:ext uri="{BB962C8B-B14F-4D97-AF65-F5344CB8AC3E}">
-        <p14:creationId xmlns:p14="http://schemas.microsoft.com/office/powerpoint/2010/main" val="1813985170"/>
+        <p14:creationId xmlns:p14="http://schemas.microsoft.com/office/powerpoint/2010/main" val="3767598054"/>
       </p:ext>
     </p:extLst>
   </p:cSld>
@@ -17251,7 +17410,7 @@
           <p:cNvPr id="2" name="Title 1">
             <a:extLst>
               <a:ext uri="{FF2B5EF4-FFF2-40B4-BE49-F238E27FC236}">
-                <a16:creationId xmlns:a16="http://schemas.microsoft.com/office/drawing/2014/main" id="{C63D8C0E-1574-BBF6-88B1-AB9FF3A0FFAA}"/>
+                <a16:creationId xmlns:a16="http://schemas.microsoft.com/office/drawing/2014/main" id="{16F86D58-152F-496B-BA81-FDA5B100832A}"/>
               </a:ext>
             </a:extLst>
           </p:cNvPr>
@@ -17269,17 +17428,29 @@
           <a:p>
             <a:r>
               <a:rPr lang="en-US" dirty="0"/>
-              <a:t>Example:</a:t>
+              <a:t>Non-Functional Requirements capture the </a:t>
+            </a:r>
+            <a:r>
+              <a:rPr lang="en-US" i="1" dirty="0">
+                <a:solidFill>
+                  <a:srgbClr val="FF0000"/>
+                </a:solidFill>
+              </a:rPr>
+              <a:t>quality goals </a:t>
+            </a:r>
+            <a:r>
+              <a:rPr lang="en-US" dirty="0"/>
+              <a:t>of the system:</a:t>
             </a:r>
           </a:p>
         </p:txBody>
       </p:sp>
       <p:sp>
         <p:nvSpPr>
-          <p:cNvPr id="3" name="Content Placeholder 2">
+          <p:cNvPr id="4" name="Slide Number Placeholder 3">
             <a:extLst>
               <a:ext uri="{FF2B5EF4-FFF2-40B4-BE49-F238E27FC236}">
-                <a16:creationId xmlns:a16="http://schemas.microsoft.com/office/drawing/2014/main" id="{009A0602-C0AF-1851-FCAF-0C6C5D5BAE34}"/>
+                <a16:creationId xmlns:a16="http://schemas.microsoft.com/office/drawing/2014/main" id="{C7C3DEB3-F948-4B7E-8BDA-FB7ABCF7A993}"/>
               </a:ext>
             </a:extLst>
           </p:cNvPr>
@@ -17287,7 +17458,7 @@
             <a:spLocks noGrp="1"/>
           </p:cNvSpPr>
           <p:nvPr>
-            <p:ph idx="1"/>
+            <p:ph type="sldNum" sz="quarter" idx="12"/>
           </p:nvPr>
         </p:nvSpPr>
         <p:spPr/>
@@ -17295,22 +17466,20 @@
           <a:bodyPr/>
           <a:lstStyle/>
           <a:p>
-            <a:r>
-              <a:rPr lang="en-US" dirty="0"/>
-              <a:t>“With a 4-core server and 16 GB RAM, the system should be able to service at least 200 simultaneous clients with less than 300ms latency”</a:t>
-            </a:r>
-          </a:p>
-          <a:p>
-            <a:endParaRPr lang="en-US" dirty="0"/>
+            <a:fld id="{20F37917-FD3A-4669-9018-DA04BCDD3D75}" type="slidenum">
+              <a:rPr lang="en-US" smtClean="0"/>
+              <a:t>27</a:t>
+            </a:fld>
+            <a:endParaRPr lang="en-US"/>
           </a:p>
         </p:txBody>
       </p:sp>
       <p:sp>
         <p:nvSpPr>
-          <p:cNvPr id="4" name="Slide Number Placeholder 3">
+          <p:cNvPr id="9" name="Content Placeholder 2">
             <a:extLst>
               <a:ext uri="{FF2B5EF4-FFF2-40B4-BE49-F238E27FC236}">
-                <a16:creationId xmlns:a16="http://schemas.microsoft.com/office/drawing/2014/main" id="{8A3071A0-45E5-16FD-D5DF-6FC0E1B1672F}"/>
+                <a16:creationId xmlns:a16="http://schemas.microsoft.com/office/drawing/2014/main" id="{154B344C-9133-E9C8-0056-74943F854D75}"/>
               </a:ext>
             </a:extLst>
           </p:cNvPr>
@@ -17318,26 +17487,65 @@
             <a:spLocks noGrp="1"/>
           </p:cNvSpPr>
           <p:nvPr>
-            <p:ph type="sldNum" sz="quarter" idx="12"/>
-          </p:nvPr>
-        </p:nvSpPr>
-        <p:spPr/>
+            <p:ph idx="1"/>
+          </p:nvPr>
+        </p:nvSpPr>
+        <p:spPr>
+          <a:xfrm>
+            <a:off x="838200" y="1500188"/>
+            <a:ext cx="9521142" cy="4351337"/>
+          </a:xfrm>
+        </p:spPr>
         <p:txBody>
           <a:bodyPr/>
           <a:lstStyle/>
           <a:p>
-            <a:fld id="{20F37917-FD3A-4669-9018-DA04BCDD3D75}" type="slidenum">
-              <a:rPr lang="en-US" smtClean="0"/>
-              <a:t>27</a:t>
-            </a:fld>
-            <a:endParaRPr lang="en-US"/>
+            <a:r>
+              <a:rPr lang="en-US" dirty="0"/>
+              <a:t>What other properties might a customer want to know about the product?</a:t>
+            </a:r>
+          </a:p>
+          <a:p>
+            <a:pPr lvl="1"/>
+            <a:r>
+              <a:rPr lang="en-US" dirty="0"/>
+              <a:t>How quickly can a transcript be retrieval? (Performance)</a:t>
+            </a:r>
+          </a:p>
+          <a:p>
+            <a:pPr lvl="1"/>
+            <a:r>
+              <a:rPr lang="en-US" dirty="0"/>
+              <a:t>How many student transcripts can our system store? (Scalability)</a:t>
+            </a:r>
+          </a:p>
+          <a:p>
+            <a:pPr lvl="1"/>
+            <a:r>
+              <a:rPr lang="en-US" dirty="0"/>
+              <a:t>How long did I spend on the phone with support to set up the software? (Usability)</a:t>
+            </a:r>
+          </a:p>
+          <a:p>
+            <a:pPr lvl="1"/>
+            <a:r>
+              <a:rPr lang="en-US" dirty="0"/>
+              <a:t>After my system is setup, is the access controlled at all? (Security)</a:t>
+            </a:r>
+          </a:p>
+          <a:p>
+            <a:pPr lvl="1"/>
+            <a:r>
+              <a:rPr lang="en-US" dirty="0"/>
+              <a:t>Are these any times when I can’t use this system? (Availability) </a:t>
+            </a:r>
           </a:p>
         </p:txBody>
       </p:sp>
     </p:spTree>
     <p:extLst>
       <p:ext uri="{BB962C8B-B14F-4D97-AF65-F5344CB8AC3E}">
-        <p14:creationId xmlns:p14="http://schemas.microsoft.com/office/powerpoint/2010/main" val="1645572920"/>
+        <p14:creationId xmlns:p14="http://schemas.microsoft.com/office/powerpoint/2010/main" val="1813985170"/>
       </p:ext>
     </p:extLst>
   </p:cSld>
@@ -17369,7 +17577,7 @@
           <p:cNvPr id="2" name="Title 1">
             <a:extLst>
               <a:ext uri="{FF2B5EF4-FFF2-40B4-BE49-F238E27FC236}">
-                <a16:creationId xmlns:a16="http://schemas.microsoft.com/office/drawing/2014/main" id="{16F86D58-152F-496B-BA81-FDA5B100832A}"/>
+                <a16:creationId xmlns:a16="http://schemas.microsoft.com/office/drawing/2014/main" id="{C63D8C0E-1574-BBF6-88B1-AB9FF3A0FFAA}"/>
               </a:ext>
             </a:extLst>
           </p:cNvPr>
@@ -17387,7 +17595,7 @@
           <a:p>
             <a:r>
               <a:rPr lang="en-US" dirty="0"/>
-              <a:t>Other non-functional requirements</a:t>
+              <a:t>Example:</a:t>
             </a:r>
           </a:p>
         </p:txBody>
@@ -17397,7 +17605,7 @@
           <p:cNvPr id="3" name="Content Placeholder 2">
             <a:extLst>
               <a:ext uri="{FF2B5EF4-FFF2-40B4-BE49-F238E27FC236}">
-                <a16:creationId xmlns:a16="http://schemas.microsoft.com/office/drawing/2014/main" id="{E9F968A6-CC31-4AE6-83F3-85021744E177}"/>
+                <a16:creationId xmlns:a16="http://schemas.microsoft.com/office/drawing/2014/main" id="{009A0602-C0AF-1851-FCAF-0C6C5D5BAE34}"/>
               </a:ext>
             </a:extLst>
           </p:cNvPr>
@@ -17405,88 +17613,30 @@
             <a:spLocks noGrp="1"/>
           </p:cNvSpPr>
           <p:nvPr>
-            <p:ph sz="half" idx="1"/>
-          </p:nvPr>
-        </p:nvSpPr>
-        <p:spPr>
-          <a:xfrm>
-            <a:off x="838200" y="1825625"/>
-            <a:ext cx="3149009" cy="4351338"/>
-          </a:xfrm>
-        </p:spPr>
+            <p:ph idx="1"/>
+          </p:nvPr>
+        </p:nvSpPr>
+        <p:spPr/>
         <p:txBody>
-          <a:bodyPr>
-            <a:normAutofit fontScale="92500" lnSpcReduction="20000"/>
-          </a:bodyPr>
+          <a:bodyPr/>
           <a:lstStyle/>
           <a:p>
             <a:r>
               <a:rPr lang="en-US" dirty="0"/>
-              <a:t>Accessibility</a:t>
-            </a:r>
-          </a:p>
-          <a:p>
-            <a:r>
-              <a:rPr lang="en-US" dirty="0"/>
-              <a:t>Availability</a:t>
-            </a:r>
-          </a:p>
-          <a:p>
-            <a:r>
-              <a:rPr lang="en-US" dirty="0"/>
-              <a:t>Capacity</a:t>
-            </a:r>
-          </a:p>
-          <a:p>
-            <a:r>
-              <a:rPr lang="en-US" dirty="0"/>
-              <a:t>Efficiency</a:t>
-            </a:r>
-          </a:p>
-          <a:p>
-            <a:r>
-              <a:rPr lang="en-US" dirty="0"/>
-              <a:t>Performance</a:t>
-            </a:r>
-          </a:p>
-          <a:p>
-            <a:r>
-              <a:rPr lang="en-US" dirty="0"/>
-              <a:t>Privacy</a:t>
-            </a:r>
-          </a:p>
-          <a:p>
-            <a:r>
-              <a:rPr lang="en-US" dirty="0"/>
-              <a:t>Response Time</a:t>
-            </a:r>
-          </a:p>
-          <a:p>
-            <a:r>
-              <a:rPr lang="en-US" dirty="0"/>
-              <a:t>Security</a:t>
-            </a:r>
-          </a:p>
-          <a:p>
-            <a:r>
-              <a:rPr lang="en-US" dirty="0"/>
-              <a:t>Supportability</a:t>
-            </a:r>
-          </a:p>
-          <a:p>
-            <a:r>
-              <a:rPr lang="en-US" dirty="0"/>
-              <a:t>Usability</a:t>
-            </a:r>
+              <a:t>“With a 4-core server and 16 GB RAM, the system should be able to service at least 200 simultaneous clients with less than 300ms latency”</a:t>
+            </a:r>
+          </a:p>
+          <a:p>
+            <a:endParaRPr lang="en-US" dirty="0"/>
           </a:p>
         </p:txBody>
       </p:sp>
       <p:sp>
         <p:nvSpPr>
-          <p:cNvPr id="5" name="Content Placeholder 4">
+          <p:cNvPr id="4" name="Slide Number Placeholder 3">
             <a:extLst>
               <a:ext uri="{FF2B5EF4-FFF2-40B4-BE49-F238E27FC236}">
-                <a16:creationId xmlns:a16="http://schemas.microsoft.com/office/drawing/2014/main" id="{224FF867-5557-8972-511A-A48D30439F35}"/>
+                <a16:creationId xmlns:a16="http://schemas.microsoft.com/office/drawing/2014/main" id="{8A3071A0-45E5-16FD-D5DF-6FC0E1B1672F}"/>
               </a:ext>
             </a:extLst>
           </p:cNvPr>
@@ -17494,38 +17644,6 @@
             <a:spLocks noGrp="1"/>
           </p:cNvSpPr>
           <p:nvPr>
-            <p:ph sz="half" idx="2"/>
-          </p:nvPr>
-        </p:nvSpPr>
-        <p:spPr>
-          <a:xfrm>
-            <a:off x="4401879" y="2950757"/>
-            <a:ext cx="5181600" cy="1587426"/>
-          </a:xfrm>
-        </p:spPr>
-        <p:txBody>
-          <a:bodyPr>
-            <a:normAutofit fontScale="92500" lnSpcReduction="20000"/>
-          </a:bodyPr>
-          <a:lstStyle/>
-          <a:p>
-            <a:endParaRPr lang="en-US" dirty="0"/>
-          </a:p>
-        </p:txBody>
-      </p:sp>
-      <p:sp>
-        <p:nvSpPr>
-          <p:cNvPr id="4" name="Slide Number Placeholder 3">
-            <a:extLst>
-              <a:ext uri="{FF2B5EF4-FFF2-40B4-BE49-F238E27FC236}">
-                <a16:creationId xmlns:a16="http://schemas.microsoft.com/office/drawing/2014/main" id="{C7C3DEB3-F948-4B7E-8BDA-FB7ABCF7A993}"/>
-              </a:ext>
-            </a:extLst>
-          </p:cNvPr>
-          <p:cNvSpPr>
-            <a:spLocks noGrp="1"/>
-          </p:cNvSpPr>
-          <p:nvPr>
             <p:ph type="sldNum" sz="quarter" idx="12"/>
           </p:nvPr>
         </p:nvSpPr>
@@ -17545,7 +17663,7 @@
     </p:spTree>
     <p:extLst>
       <p:ext uri="{BB962C8B-B14F-4D97-AF65-F5344CB8AC3E}">
-        <p14:creationId xmlns:p14="http://schemas.microsoft.com/office/powerpoint/2010/main" val="2709284930"/>
+        <p14:creationId xmlns:p14="http://schemas.microsoft.com/office/powerpoint/2010/main" val="1645572920"/>
       </p:ext>
     </p:extLst>
   </p:cSld>
@@ -17595,7 +17713,7 @@
           <a:p>
             <a:r>
               <a:rPr lang="en-US" dirty="0"/>
-              <a:t>Still more non-functional requirements</a:t>
+              <a:t>Other non-functional requirements</a:t>
             </a:r>
           </a:p>
         </p:txBody>
@@ -17613,53 +17731,111 @@
             <a:spLocks noGrp="1"/>
           </p:cNvSpPr>
           <p:nvPr>
-            <p:ph idx="1"/>
+            <p:ph sz="half" idx="1"/>
           </p:nvPr>
         </p:nvSpPr>
         <p:spPr>
           <a:xfrm>
-            <a:off x="838200" y="1500160"/>
-            <a:ext cx="10515600" cy="4351338"/>
+            <a:off x="838200" y="1825625"/>
+            <a:ext cx="3149009" cy="4351338"/>
           </a:xfrm>
         </p:spPr>
         <p:txBody>
           <a:bodyPr>
-            <a:normAutofit/>
+            <a:normAutofit fontScale="92500" lnSpcReduction="20000"/>
           </a:bodyPr>
           <a:lstStyle/>
           <a:p>
             <a:r>
               <a:rPr lang="en-US" dirty="0"/>
-              <a:t>Qualities that reflect the evolution of the system</a:t>
-            </a:r>
-          </a:p>
-          <a:p>
-            <a:pPr lvl="1"/>
+              <a:t>Accessibility</a:t>
+            </a:r>
+          </a:p>
+          <a:p>
             <a:r>
               <a:rPr lang="en-US" dirty="0"/>
-              <a:t>Testability</a:t>
-            </a:r>
-          </a:p>
-          <a:p>
-            <a:pPr lvl="1"/>
+              <a:t>Availability</a:t>
+            </a:r>
+          </a:p>
+          <a:p>
             <a:r>
               <a:rPr lang="en-US" dirty="0"/>
-              <a:t>Maintainability</a:t>
-            </a:r>
-          </a:p>
-          <a:p>
-            <a:pPr lvl="1"/>
+              <a:t>Capacity</a:t>
+            </a:r>
+          </a:p>
+          <a:p>
             <a:r>
               <a:rPr lang="en-US" dirty="0"/>
-              <a:t>Extensibility</a:t>
-            </a:r>
-          </a:p>
-          <a:p>
-            <a:pPr lvl="1"/>
+              <a:t>Efficiency</a:t>
+            </a:r>
+          </a:p>
+          <a:p>
             <a:r>
               <a:rPr lang="en-US" dirty="0"/>
-              <a:t>Scalability</a:t>
-            </a:r>
+              <a:t>Performance</a:t>
+            </a:r>
+          </a:p>
+          <a:p>
+            <a:r>
+              <a:rPr lang="en-US" dirty="0"/>
+              <a:t>Privacy</a:t>
+            </a:r>
+          </a:p>
+          <a:p>
+            <a:r>
+              <a:rPr lang="en-US" dirty="0"/>
+              <a:t>Response Time</a:t>
+            </a:r>
+          </a:p>
+          <a:p>
+            <a:r>
+              <a:rPr lang="en-US" dirty="0"/>
+              <a:t>Security</a:t>
+            </a:r>
+          </a:p>
+          <a:p>
+            <a:r>
+              <a:rPr lang="en-US" dirty="0"/>
+              <a:t>Supportability</a:t>
+            </a:r>
+          </a:p>
+          <a:p>
+            <a:r>
+              <a:rPr lang="en-US" dirty="0"/>
+              <a:t>Usability</a:t>
+            </a:r>
+          </a:p>
+        </p:txBody>
+      </p:sp>
+      <p:sp>
+        <p:nvSpPr>
+          <p:cNvPr id="5" name="Content Placeholder 4">
+            <a:extLst>
+              <a:ext uri="{FF2B5EF4-FFF2-40B4-BE49-F238E27FC236}">
+                <a16:creationId xmlns:a16="http://schemas.microsoft.com/office/drawing/2014/main" id="{224FF867-5557-8972-511A-A48D30439F35}"/>
+              </a:ext>
+            </a:extLst>
+          </p:cNvPr>
+          <p:cNvSpPr>
+            <a:spLocks noGrp="1"/>
+          </p:cNvSpPr>
+          <p:nvPr>
+            <p:ph sz="half" idx="2"/>
+          </p:nvPr>
+        </p:nvSpPr>
+        <p:spPr>
+          <a:xfrm>
+            <a:off x="4401879" y="2950757"/>
+            <a:ext cx="5181600" cy="1587426"/>
+          </a:xfrm>
+        </p:spPr>
+        <p:txBody>
+          <a:bodyPr>
+            <a:normAutofit fontScale="92500" lnSpcReduction="20000"/>
+          </a:bodyPr>
+          <a:lstStyle/>
+          <a:p>
+            <a:endParaRPr lang="en-US" dirty="0"/>
           </a:p>
         </p:txBody>
       </p:sp>
@@ -17695,7 +17871,7 @@
     </p:spTree>
     <p:extLst>
       <p:ext uri="{BB962C8B-B14F-4D97-AF65-F5344CB8AC3E}">
-        <p14:creationId xmlns:p14="http://schemas.microsoft.com/office/powerpoint/2010/main" val="667178669"/>
+        <p14:creationId xmlns:p14="http://schemas.microsoft.com/office/powerpoint/2010/main" val="2709284930"/>
       </p:ext>
     </p:extLst>
   </p:cSld>
@@ -18158,6 +18334,156 @@
           <p:cNvPr id="2" name="Title 1">
             <a:extLst>
               <a:ext uri="{FF2B5EF4-FFF2-40B4-BE49-F238E27FC236}">
+                <a16:creationId xmlns:a16="http://schemas.microsoft.com/office/drawing/2014/main" id="{16F86D58-152F-496B-BA81-FDA5B100832A}"/>
+              </a:ext>
+            </a:extLst>
+          </p:cNvPr>
+          <p:cNvSpPr>
+            <a:spLocks noGrp="1"/>
+          </p:cNvSpPr>
+          <p:nvPr>
+            <p:ph type="title"/>
+          </p:nvPr>
+        </p:nvSpPr>
+        <p:spPr/>
+        <p:txBody>
+          <a:bodyPr/>
+          <a:lstStyle/>
+          <a:p>
+            <a:r>
+              <a:rPr lang="en-US" dirty="0"/>
+              <a:t>Still more non-functional requirements</a:t>
+            </a:r>
+          </a:p>
+        </p:txBody>
+      </p:sp>
+      <p:sp>
+        <p:nvSpPr>
+          <p:cNvPr id="3" name="Content Placeholder 2">
+            <a:extLst>
+              <a:ext uri="{FF2B5EF4-FFF2-40B4-BE49-F238E27FC236}">
+                <a16:creationId xmlns:a16="http://schemas.microsoft.com/office/drawing/2014/main" id="{E9F968A6-CC31-4AE6-83F3-85021744E177}"/>
+              </a:ext>
+            </a:extLst>
+          </p:cNvPr>
+          <p:cNvSpPr>
+            <a:spLocks noGrp="1"/>
+          </p:cNvSpPr>
+          <p:nvPr>
+            <p:ph idx="1"/>
+          </p:nvPr>
+        </p:nvSpPr>
+        <p:spPr>
+          <a:xfrm>
+            <a:off x="838200" y="1500160"/>
+            <a:ext cx="10515600" cy="4351338"/>
+          </a:xfrm>
+        </p:spPr>
+        <p:txBody>
+          <a:bodyPr>
+            <a:normAutofit/>
+          </a:bodyPr>
+          <a:lstStyle/>
+          <a:p>
+            <a:r>
+              <a:rPr lang="en-US" dirty="0"/>
+              <a:t>Qualities that reflect the evolution of the system</a:t>
+            </a:r>
+          </a:p>
+          <a:p>
+            <a:pPr lvl="1"/>
+            <a:r>
+              <a:rPr lang="en-US" dirty="0"/>
+              <a:t>Testability</a:t>
+            </a:r>
+          </a:p>
+          <a:p>
+            <a:pPr lvl="1"/>
+            <a:r>
+              <a:rPr lang="en-US" dirty="0"/>
+              <a:t>Maintainability</a:t>
+            </a:r>
+          </a:p>
+          <a:p>
+            <a:pPr lvl="1"/>
+            <a:r>
+              <a:rPr lang="en-US" dirty="0"/>
+              <a:t>Extensibility</a:t>
+            </a:r>
+          </a:p>
+          <a:p>
+            <a:pPr lvl="1"/>
+            <a:r>
+              <a:rPr lang="en-US" dirty="0"/>
+              <a:t>Scalability</a:t>
+            </a:r>
+          </a:p>
+        </p:txBody>
+      </p:sp>
+      <p:sp>
+        <p:nvSpPr>
+          <p:cNvPr id="4" name="Slide Number Placeholder 3">
+            <a:extLst>
+              <a:ext uri="{FF2B5EF4-FFF2-40B4-BE49-F238E27FC236}">
+                <a16:creationId xmlns:a16="http://schemas.microsoft.com/office/drawing/2014/main" id="{C7C3DEB3-F948-4B7E-8BDA-FB7ABCF7A993}"/>
+              </a:ext>
+            </a:extLst>
+          </p:cNvPr>
+          <p:cNvSpPr>
+            <a:spLocks noGrp="1"/>
+          </p:cNvSpPr>
+          <p:nvPr>
+            <p:ph type="sldNum" sz="quarter" idx="12"/>
+          </p:nvPr>
+        </p:nvSpPr>
+        <p:spPr/>
+        <p:txBody>
+          <a:bodyPr/>
+          <a:lstStyle/>
+          <a:p>
+            <a:fld id="{20F37917-FD3A-4669-9018-DA04BCDD3D75}" type="slidenum">
+              <a:rPr lang="en-US" smtClean="0"/>
+              <a:t>30</a:t>
+            </a:fld>
+            <a:endParaRPr lang="en-US"/>
+          </a:p>
+        </p:txBody>
+      </p:sp>
+    </p:spTree>
+    <p:extLst>
+      <p:ext uri="{BB962C8B-B14F-4D97-AF65-F5344CB8AC3E}">
+        <p14:creationId xmlns:p14="http://schemas.microsoft.com/office/powerpoint/2010/main" val="667178669"/>
+      </p:ext>
+    </p:extLst>
+  </p:cSld>
+  <p:clrMapOvr>
+    <a:masterClrMapping/>
+  </p:clrMapOvr>
+</p:sld>
+</file>
+
+<file path=ppt/slides/slide31.xml><?xml version="1.0" encoding="utf-8"?>
+<p:sld xmlns:a="http://schemas.openxmlformats.org/drawingml/2006/main" xmlns:r="http://schemas.openxmlformats.org/officeDocument/2006/relationships" xmlns:p="http://schemas.openxmlformats.org/presentationml/2006/main">
+  <p:cSld>
+    <p:spTree>
+      <p:nvGrpSpPr>
+        <p:cNvPr id="1" name=""/>
+        <p:cNvGrpSpPr/>
+        <p:nvPr/>
+      </p:nvGrpSpPr>
+      <p:grpSpPr>
+        <a:xfrm>
+          <a:off x="0" y="0"/>
+          <a:ext cx="0" cy="0"/>
+          <a:chOff x="0" y="0"/>
+          <a:chExt cx="0" cy="0"/>
+        </a:xfrm>
+      </p:grpSpPr>
+      <p:sp>
+        <p:nvSpPr>
+          <p:cNvPr id="2" name="Title 1">
+            <a:extLst>
+              <a:ext uri="{FF2B5EF4-FFF2-40B4-BE49-F238E27FC236}">
                 <a16:creationId xmlns:a16="http://schemas.microsoft.com/office/drawing/2014/main" id="{F23E412C-C21C-9A47-9132-9BC666325FD4}"/>
               </a:ext>
             </a:extLst>
@@ -18269,7 +18595,7 @@
           <a:p>
             <a:fld id="{20F37917-FD3A-4669-9018-DA04BCDD3D75}" type="slidenum">
               <a:rPr lang="en-US" smtClean="0"/>
-              <a:t>30</a:t>
+              <a:t>31</a:t>
             </a:fld>
             <a:endParaRPr lang="en-US"/>
           </a:p>
@@ -18350,7 +18676,7 @@
 </p:sld>
 </file>
 
-<file path=ppt/slides/slide31.xml><?xml version="1.0" encoding="utf-8"?>
+<file path=ppt/slides/slide32.xml><?xml version="1.0" encoding="utf-8"?>
 <p:sld xmlns:a="http://schemas.openxmlformats.org/drawingml/2006/main" xmlns:r="http://schemas.openxmlformats.org/officeDocument/2006/relationships" xmlns:p="http://schemas.openxmlformats.org/presentationml/2006/main">
   <p:cSld>
     <p:spTree>
@@ -18479,7 +18805,7 @@
           <a:p>
             <a:fld id="{20F37917-FD3A-4669-9018-DA04BCDD3D75}" type="slidenum">
               <a:rPr lang="en-US" smtClean="0"/>
-              <a:t>31</a:t>
+              <a:t>32</a:t>
             </a:fld>
             <a:endParaRPr lang="en-US"/>
           </a:p>
@@ -23761,7 +24087,7 @@
         <p:spPr>
           <a:xfrm>
             <a:off x="1811593" y="1806137"/>
-            <a:ext cx="8364794" cy="1446550"/>
+            <a:ext cx="8364794" cy="2123658"/>
           </a:xfrm>
           <a:prstGeom prst="rect">
             <a:avLst/>
@@ -23803,7 +24129,29 @@
                 </a:solidFill>
                 <a:latin typeface="Ink Free" panose="03080402000500000000" pitchFamily="66" charset="0"/>
               </a:rPr>
-              <a:t>As a &lt;role&gt; I want &lt;capability&gt; so that I can &lt;get some benefit&gt;</a:t>
+              <a:t>As a &lt;role&gt; I want </a:t>
+            </a:r>
+          </a:p>
+          <a:p>
+            <a:r>
+              <a:rPr lang="en-US" sz="4400" b="1" i="1" dirty="0">
+                <a:solidFill>
+                  <a:srgbClr val="FF0000"/>
+                </a:solidFill>
+                <a:latin typeface="Ink Free" panose="03080402000500000000" pitchFamily="66" charset="0"/>
+              </a:rPr>
+              <a:t>&lt;some capability&gt; </a:t>
+            </a:r>
+          </a:p>
+          <a:p>
+            <a:r>
+              <a:rPr lang="en-US" sz="4400" b="1" i="1" dirty="0">
+                <a:solidFill>
+                  <a:srgbClr val="FF0000"/>
+                </a:solidFill>
+                <a:latin typeface="Ink Free" panose="03080402000500000000" pitchFamily="66" charset="0"/>
+              </a:rPr>
+              <a:t>so that I can &lt;get some benefit&gt;</a:t>
             </a:r>
           </a:p>
         </p:txBody>
@@ -23837,7 +24185,7 @@
         </p:blipFill>
         <p:spPr bwMode="auto">
           <a:xfrm>
-            <a:off x="7239682" y="3839260"/>
+            <a:off x="7239682" y="4046497"/>
             <a:ext cx="3612674" cy="2408449"/>
           </a:xfrm>
           <a:prstGeom prst="rect">
@@ -23869,7 +24217,7 @@
         </p:nvSpPr>
         <p:spPr>
           <a:xfrm>
-            <a:off x="984853" y="3839260"/>
+            <a:off x="984853" y="4243162"/>
             <a:ext cx="5626395" cy="1691180"/>
           </a:xfrm>
           <a:prstGeom prst="rect">

</xml_diff>

<commit_message>
fixed two typos in M01.2 slides
</commit_message>
<xml_diff>
--- a/Slides/Module 01.2 Requirements Gathering.pptx
+++ b/Slides/Module 01.2 Requirements Gathering.pptx
@@ -6115,7 +6115,7 @@
           <a:p>
             <a:fld id="{7C7E5181-6CF5-45F7-A87A-E0E0B1FD7549}" type="datetimeFigureOut">
               <a:rPr lang="en-US" smtClean="0"/>
-              <a:t>12/26/2024</a:t>
+              <a:t>12/30/2024</a:t>
             </a:fld>
             <a:endParaRPr lang="en-US"/>
           </a:p>
@@ -9425,7 +9425,7 @@
           <a:p>
             <a:fld id="{5D2A64DE-480B-420F-9649-4F8E696E08E0}" type="datetime1">
               <a:rPr lang="en-US" smtClean="0"/>
-              <a:t>12/26/2024</a:t>
+              <a:t>12/30/2024</a:t>
             </a:fld>
             <a:endParaRPr lang="en-US"/>
           </a:p>
@@ -9749,7 +9749,7 @@
           <a:p>
             <a:fld id="{EA476A42-A091-4468-A075-64A31BE59948}" type="datetime1">
               <a:rPr lang="en-US" smtClean="0"/>
-              <a:t>12/26/2024</a:t>
+              <a:t>12/30/2024</a:t>
             </a:fld>
             <a:endParaRPr lang="en-US"/>
           </a:p>
@@ -9947,7 +9947,7 @@
           <a:p>
             <a:fld id="{0D3616D0-8311-4107-9726-6B805E7D05BA}" type="datetime1">
               <a:rPr lang="en-US" smtClean="0"/>
-              <a:t>12/26/2024</a:t>
+              <a:t>12/30/2024</a:t>
             </a:fld>
             <a:endParaRPr lang="en-US"/>
           </a:p>
@@ -10155,7 +10155,7 @@
           <a:p>
             <a:fld id="{3BC2557A-5C88-417A-A763-5AC779462A5F}" type="datetime1">
               <a:rPr lang="en-US" smtClean="0"/>
-              <a:t>12/26/2024</a:t>
+              <a:t>12/30/2024</a:t>
             </a:fld>
             <a:endParaRPr lang="en-US"/>
           </a:p>
@@ -10679,7 +10679,7 @@
           <a:p>
             <a:fld id="{07C7BFD4-467E-4EDE-93EA-052F5B39A4E5}" type="datetime1">
               <a:rPr lang="en-US" smtClean="0"/>
-              <a:t>12/26/2024</a:t>
+              <a:t>12/30/2024</a:t>
             </a:fld>
             <a:endParaRPr lang="en-US"/>
           </a:p>
@@ -10929,7 +10929,7 @@
           <a:p>
             <a:fld id="{07C7BFD4-467E-4EDE-93EA-052F5B39A4E5}" type="datetime1">
               <a:rPr lang="en-US" smtClean="0"/>
-              <a:t>12/26/2024</a:t>
+              <a:t>12/30/2024</a:t>
             </a:fld>
             <a:endParaRPr lang="en-US"/>
           </a:p>
@@ -11111,7 +11111,7 @@
           <a:p>
             <a:fld id="{109E55A0-C911-4F03-82FC-7E5926047D46}" type="datetime1">
               <a:rPr lang="en-US" smtClean="0"/>
-              <a:t>12/26/2024</a:t>
+              <a:t>12/30/2024</a:t>
             </a:fld>
             <a:endParaRPr lang="en-US"/>
           </a:p>
@@ -11424,7 +11424,7 @@
           <a:p>
             <a:fld id="{A533CBE2-D5BE-47AC-ADC2-9CDFC1D0CF90}" type="datetime1">
               <a:rPr lang="en-US" smtClean="0"/>
-              <a:t>12/26/2024</a:t>
+              <a:t>12/30/2024</a:t>
             </a:fld>
             <a:endParaRPr lang="en-US"/>
           </a:p>
@@ -11725,7 +11725,7 @@
           <a:p>
             <a:fld id="{39B7EDB1-CE74-4951-85A2-0B01C2128E28}" type="datetime1">
               <a:rPr lang="en-US" smtClean="0"/>
-              <a:t>12/26/2024</a:t>
+              <a:t>12/30/2024</a:t>
             </a:fld>
             <a:endParaRPr lang="en-US"/>
           </a:p>
@@ -12173,7 +12173,7 @@
           <a:p>
             <a:fld id="{2BC7EB92-A5C2-4807-A9DC-9EDE6CBFB241}" type="datetime1">
               <a:rPr lang="en-US" smtClean="0"/>
-              <a:t>12/26/2024</a:t>
+              <a:t>12/30/2024</a:t>
             </a:fld>
             <a:endParaRPr lang="en-US"/>
           </a:p>
@@ -12286,7 +12286,7 @@
           <a:p>
             <a:fld id="{2B7B7EE0-7771-4CD5-9B2B-3550753A54A1}" type="datetime1">
               <a:rPr lang="en-US" smtClean="0"/>
-              <a:t>12/26/2024</a:t>
+              <a:t>12/30/2024</a:t>
             </a:fld>
             <a:endParaRPr lang="en-US"/>
           </a:p>
@@ -12597,7 +12597,7 @@
           <a:p>
             <a:fld id="{F8B318B3-0E87-4416-A9B8-D891968C2727}" type="datetime1">
               <a:rPr lang="en-US" smtClean="0"/>
-              <a:t>12/26/2024</a:t>
+              <a:t>12/30/2024</a:t>
             </a:fld>
             <a:endParaRPr lang="en-US"/>
           </a:p>
@@ -12838,7 +12838,7 @@
           <a:p>
             <a:fld id="{54D997E8-DDEE-43F1-8D9B-F8A1E11DE488}" type="datetime1">
               <a:rPr lang="en-US" smtClean="0"/>
-              <a:t>12/26/2024</a:t>
+              <a:t>12/30/2024</a:t>
             </a:fld>
             <a:endParaRPr lang="en-US"/>
           </a:p>
@@ -15079,15 +15079,7 @@
           <a:p>
             <a:r>
               <a:rPr lang="en-US" dirty="0"/>
-              <a:t>1.2 I should be able to </a:t>
-            </a:r>
-            <a:r>
-              <a:rPr lang="en-US" dirty="0" err="1"/>
-              <a:t>to</a:t>
-            </a:r>
-            <a:r>
-              <a:rPr lang="en-US" dirty="0"/>
-              <a:t> see whether the pothole I report has been repaired (E)</a:t>
+              <a:t>1.2 I should be able to see whether the pothole I report has been repaired (E)</a:t>
             </a:r>
           </a:p>
           <a:p>
@@ -17804,38 +17796,6 @@
               <a:rPr lang="en-US" dirty="0"/>
               <a:t>Usability</a:t>
             </a:r>
-          </a:p>
-        </p:txBody>
-      </p:sp>
-      <p:sp>
-        <p:nvSpPr>
-          <p:cNvPr id="5" name="Content Placeholder 4">
-            <a:extLst>
-              <a:ext uri="{FF2B5EF4-FFF2-40B4-BE49-F238E27FC236}">
-                <a16:creationId xmlns:a16="http://schemas.microsoft.com/office/drawing/2014/main" id="{224FF867-5557-8972-511A-A48D30439F35}"/>
-              </a:ext>
-            </a:extLst>
-          </p:cNvPr>
-          <p:cNvSpPr>
-            <a:spLocks noGrp="1"/>
-          </p:cNvSpPr>
-          <p:nvPr>
-            <p:ph sz="half" idx="2"/>
-          </p:nvPr>
-        </p:nvSpPr>
-        <p:spPr>
-          <a:xfrm>
-            <a:off x="4401879" y="2950757"/>
-            <a:ext cx="5181600" cy="1587426"/>
-          </a:xfrm>
-        </p:spPr>
-        <p:txBody>
-          <a:bodyPr>
-            <a:normAutofit fontScale="92500" lnSpcReduction="20000"/>
-          </a:bodyPr>
-          <a:lstStyle/>
-          <a:p>
-            <a:endParaRPr lang="en-US" dirty="0"/>
           </a:p>
         </p:txBody>
       </p:sp>

</xml_diff>